<commit_message>
Adjust BDD's apresentation with suggestions
</commit_message>
<xml_diff>
--- a/MDS_Material/BDD/Apresentação-MDS-BDD.pptx
+++ b/MDS_Material/BDD/Apresentação-MDS-BDD.pptx
@@ -25,28 +25,32 @@
     <p:sldId id="270" r:id="rId20"/>
     <p:sldId id="271" r:id="rId21"/>
     <p:sldId id="272" r:id="rId22"/>
+    <p:sldId id="273" r:id="rId23"/>
+    <p:sldId id="274" r:id="rId24"/>
+    <p:sldId id="275" r:id="rId25"/>
+    <p:sldId id="276" r:id="rId26"/>
   </p:sldIdLst>
   <p:sldSz cy="5143500" cx="9144000"/>
   <p:notesSz cx="6858000" cy="9144000"/>
   <p:embeddedFontLst>
     <p:embeddedFont>
       <p:font typeface="Roboto Slab Light"/>
-      <p:regular r:id="rId23"/>
-      <p:bold r:id="rId24"/>
+      <p:regular r:id="rId27"/>
+      <p:bold r:id="rId28"/>
     </p:embeddedFont>
     <p:embeddedFont>
       <p:font typeface="Lato"/>
-      <p:regular r:id="rId25"/>
-      <p:bold r:id="rId26"/>
-      <p:italic r:id="rId27"/>
-      <p:boldItalic r:id="rId28"/>
-    </p:embeddedFont>
-    <p:embeddedFont>
-      <p:font typeface="Lato Light"/>
       <p:regular r:id="rId29"/>
       <p:bold r:id="rId30"/>
       <p:italic r:id="rId31"/>
       <p:boldItalic r:id="rId32"/>
+    </p:embeddedFont>
+    <p:embeddedFont>
+      <p:font typeface="Lato Light"/>
+      <p:regular r:id="rId33"/>
+      <p:bold r:id="rId34"/>
+      <p:italic r:id="rId35"/>
+      <p:boldItalic r:id="rId36"/>
     </p:embeddedFont>
   </p:embeddedFontLst>
   <p:defaultTextStyle>
@@ -518,7 +522,7 @@
   <p:cSld>
     <p:spTree>
       <p:nvGrpSpPr>
-        <p:cNvPr id="437" name="Shape 437"/>
+        <p:cNvPr id="436" name="Shape 436"/>
         <p:cNvGrpSpPr/>
         <p:nvPr/>
       </p:nvGrpSpPr>
@@ -532,7 +536,7 @@
       </p:grpSpPr>
       <p:sp>
         <p:nvSpPr>
-          <p:cNvPr id="438" name="Shape 438"/>
+          <p:cNvPr id="437" name="Shape 437"/>
           <p:cNvSpPr/>
           <p:nvPr>
             <p:ph idx="2" type="sldImg"/>
@@ -566,7 +570,171 @@
       </p:sp>
       <p:sp>
         <p:nvSpPr>
-          <p:cNvPr id="439" name="Shape 439"/>
+          <p:cNvPr id="438" name="Shape 438"/>
+          <p:cNvSpPr txBox="1"/>
+          <p:nvPr>
+            <p:ph idx="1" type="body"/>
+          </p:nvPr>
+        </p:nvSpPr>
+        <p:spPr>
+          <a:xfrm>
+            <a:off x="685800" y="4343400"/>
+            <a:ext cx="5486399" cy="4114800"/>
+          </a:xfrm>
+          <a:prstGeom prst="rect">
+            <a:avLst/>
+          </a:prstGeom>
+        </p:spPr>
+        <p:txBody>
+          <a:bodyPr anchorCtr="0" anchor="t" bIns="91425" lIns="91425" rIns="91425" tIns="91425">
+            <a:noAutofit/>
+          </a:bodyPr>
+          <a:lstStyle/>
+          <a:p>
+            <a:pPr lvl="0" rtl="0">
+              <a:lnSpc>
+                <a:spcPct val="115000"/>
+              </a:lnSpc>
+              <a:spcBef>
+                <a:spcPts val="1500"/>
+              </a:spcBef>
+              <a:buClr>
+                <a:schemeClr val="dk1"/>
+              </a:buClr>
+              <a:buSzPct val="91666"/>
+              <a:buFont typeface="Arial"/>
+              <a:buNone/>
+            </a:pPr>
+            <a:r>
+              <a:rPr lang="en" sz="1200">
+                <a:solidFill>
+                  <a:srgbClr val="1D2021"/>
+                </a:solidFill>
+              </a:rPr>
+              <a:t>Logo, existem várias ferramentas e frameworks que apoiam esta fase do BDD, transformando esses requisitos em testes automatizados que ajudam a orientar o desenvolvedor para que a nova funcionalidade seja desenvolvida corretamente e dentro do prazo. </a:t>
+            </a:r>
+          </a:p>
+          <a:p>
+            <a:pPr indent="4845050" lvl="0" rtl="0">
+              <a:lnSpc>
+                <a:spcPct val="115000"/>
+              </a:lnSpc>
+              <a:spcBef>
+                <a:spcPts val="0"/>
+              </a:spcBef>
+              <a:buClr>
+                <a:schemeClr val="dk1"/>
+              </a:buClr>
+              <a:buSzPct val="91666"/>
+              <a:buFont typeface="Arial"/>
+              <a:buNone/>
+            </a:pPr>
+            <a:r>
+              <a:t/>
+            </a:r>
+            <a:endParaRPr sz="1200">
+              <a:solidFill>
+                <a:srgbClr val="1D2021"/>
+              </a:solidFill>
+            </a:endParaRPr>
+          </a:p>
+          <a:p>
+            <a:pPr lvl="0">
+              <a:spcBef>
+                <a:spcPts val="0"/>
+              </a:spcBef>
+              <a:buClr>
+                <a:schemeClr val="dk1"/>
+              </a:buClr>
+              <a:buSzPct val="100000"/>
+              <a:buFont typeface="Arial"/>
+              <a:buNone/>
+            </a:pPr>
+            <a:r>
+              <a:t/>
+            </a:r>
+            <a:endParaRPr>
+              <a:solidFill>
+                <a:schemeClr val="dk1"/>
+              </a:solidFill>
+            </a:endParaRPr>
+          </a:p>
+          <a:p>
+            <a:pPr lvl="0">
+              <a:spcBef>
+                <a:spcPts val="0"/>
+              </a:spcBef>
+              <a:buNone/>
+            </a:pPr>
+            <a:r>
+              <a:t/>
+            </a:r>
+            <a:endParaRPr/>
+          </a:p>
+        </p:txBody>
+      </p:sp>
+    </p:spTree>
+  </p:cSld>
+  <p:clrMapOvr>
+    <a:masterClrMapping/>
+  </p:clrMapOvr>
+</p:notes>
+</file>
+
+<file path=ppt/notesSlides/notesSlide11.xml><?xml version="1.0" encoding="utf-8"?>
+<p:notes xmlns:a="http://schemas.openxmlformats.org/drawingml/2006/main" xmlns:r="http://schemas.openxmlformats.org/officeDocument/2006/relationships" xmlns:mc="http://schemas.openxmlformats.org/markup-compatibility/2006" xmlns:mv="urn:schemas-microsoft-com:mac:vml" xmlns:p="http://schemas.openxmlformats.org/presentationml/2006/main" xmlns:c="http://schemas.openxmlformats.org/drawingml/2006/chart" xmlns:dgm="http://schemas.openxmlformats.org/drawingml/2006/diagram" xmlns:o="urn:schemas-microsoft-com:office:office" xmlns:v="urn:schemas-microsoft-com:vml" xmlns:pvml="urn:schemas-microsoft-com:office:powerpoint" xmlns:com="http://schemas.openxmlformats.org/drawingml/2006/compatibility" xmlns:p14="http://schemas.microsoft.com/office/powerpoint/2010/main" showMasterPhAnim="0" showMasterSp="0">
+  <p:cSld>
+    <p:spTree>
+      <p:nvGrpSpPr>
+        <p:cNvPr id="442" name="Shape 442"/>
+        <p:cNvGrpSpPr/>
+        <p:nvPr/>
+      </p:nvGrpSpPr>
+      <p:grpSpPr>
+        <a:xfrm>
+          <a:off x="0" y="0"/>
+          <a:ext cx="0" cy="0"/>
+          <a:chOff x="0" y="0"/>
+          <a:chExt cx="0" cy="0"/>
+        </a:xfrm>
+      </p:grpSpPr>
+      <p:sp>
+        <p:nvSpPr>
+          <p:cNvPr id="443" name="Shape 443"/>
+          <p:cNvSpPr/>
+          <p:nvPr>
+            <p:ph idx="2" type="sldImg"/>
+          </p:nvPr>
+        </p:nvSpPr>
+        <p:spPr>
+          <a:xfrm>
+            <a:off x="381175" y="685800"/>
+            <a:ext cx="6096299" cy="3429000"/>
+          </a:xfrm>
+          <a:custGeom>
+            <a:pathLst>
+              <a:path extrusionOk="0" h="120000" w="120000">
+                <a:moveTo>
+                  <a:pt x="0" y="0"/>
+                </a:moveTo>
+                <a:lnTo>
+                  <a:pt x="120000" y="0"/>
+                </a:lnTo>
+                <a:lnTo>
+                  <a:pt x="120000" y="120000"/>
+                </a:lnTo>
+                <a:lnTo>
+                  <a:pt x="0" y="120000"/>
+                </a:lnTo>
+                <a:close/>
+              </a:path>
+            </a:pathLst>
+          </a:custGeom>
+        </p:spPr>
+      </p:sp>
+      <p:sp>
+        <p:nvSpPr>
+          <p:cNvPr id="444" name="Shape 444"/>
           <p:cNvSpPr txBox="1"/>
           <p:nvPr>
             <p:ph idx="1" type="body"/>
@@ -656,12 +824,12 @@
 </p:notes>
 </file>
 
-<file path=ppt/notesSlides/notesSlide11.xml><?xml version="1.0" encoding="utf-8"?>
+<file path=ppt/notesSlides/notesSlide12.xml><?xml version="1.0" encoding="utf-8"?>
 <p:notes xmlns:a="http://schemas.openxmlformats.org/drawingml/2006/main" xmlns:r="http://schemas.openxmlformats.org/officeDocument/2006/relationships" xmlns:mc="http://schemas.openxmlformats.org/markup-compatibility/2006" xmlns:mv="urn:schemas-microsoft-com:mac:vml" xmlns:p="http://schemas.openxmlformats.org/presentationml/2006/main" xmlns:c="http://schemas.openxmlformats.org/drawingml/2006/chart" xmlns:dgm="http://schemas.openxmlformats.org/drawingml/2006/diagram" xmlns:o="urn:schemas-microsoft-com:office:office" xmlns:v="urn:schemas-microsoft-com:vml" xmlns:pvml="urn:schemas-microsoft-com:office:powerpoint" xmlns:com="http://schemas.openxmlformats.org/drawingml/2006/compatibility" xmlns:p14="http://schemas.microsoft.com/office/powerpoint/2010/main" showMasterPhAnim="0" showMasterSp="0">
   <p:cSld>
     <p:spTree>
       <p:nvGrpSpPr>
-        <p:cNvPr id="441" name="Shape 441"/>
+        <p:cNvPr id="446" name="Shape 446"/>
         <p:cNvGrpSpPr/>
         <p:nvPr/>
       </p:nvGrpSpPr>
@@ -675,7 +843,7 @@
       </p:grpSpPr>
       <p:sp>
         <p:nvSpPr>
-          <p:cNvPr id="442" name="Shape 442"/>
+          <p:cNvPr id="447" name="Shape 447"/>
           <p:cNvSpPr/>
           <p:nvPr>
             <p:ph idx="2" type="sldImg"/>
@@ -709,102 +877,7 @@
       </p:sp>
       <p:sp>
         <p:nvSpPr>
-          <p:cNvPr id="443" name="Shape 443"/>
-          <p:cNvSpPr txBox="1"/>
-          <p:nvPr>
-            <p:ph idx="1" type="body"/>
-          </p:nvPr>
-        </p:nvSpPr>
-        <p:spPr>
-          <a:xfrm>
-            <a:off x="685800" y="4343400"/>
-            <a:ext cx="5486399" cy="4114800"/>
-          </a:xfrm>
-          <a:prstGeom prst="rect">
-            <a:avLst/>
-          </a:prstGeom>
-        </p:spPr>
-        <p:txBody>
-          <a:bodyPr anchorCtr="0" anchor="t" bIns="91425" lIns="91425" rIns="91425" tIns="91425">
-            <a:noAutofit/>
-          </a:bodyPr>
-          <a:lstStyle/>
-          <a:p>
-            <a:pPr lvl="0">
-              <a:spcBef>
-                <a:spcPts val="0"/>
-              </a:spcBef>
-              <a:buNone/>
-            </a:pPr>
-            <a:r>
-              <a:t/>
-            </a:r>
-            <a:endParaRPr/>
-          </a:p>
-        </p:txBody>
-      </p:sp>
-    </p:spTree>
-  </p:cSld>
-  <p:clrMapOvr>
-    <a:masterClrMapping/>
-  </p:clrMapOvr>
-</p:notes>
-</file>
-
-<file path=ppt/notesSlides/notesSlide12.xml><?xml version="1.0" encoding="utf-8"?>
-<p:notes xmlns:a="http://schemas.openxmlformats.org/drawingml/2006/main" xmlns:r="http://schemas.openxmlformats.org/officeDocument/2006/relationships" xmlns:mc="http://schemas.openxmlformats.org/markup-compatibility/2006" xmlns:mv="urn:schemas-microsoft-com:mac:vml" xmlns:p="http://schemas.openxmlformats.org/presentationml/2006/main" xmlns:c="http://schemas.openxmlformats.org/drawingml/2006/chart" xmlns:dgm="http://schemas.openxmlformats.org/drawingml/2006/diagram" xmlns:o="urn:schemas-microsoft-com:office:office" xmlns:v="urn:schemas-microsoft-com:vml" xmlns:pvml="urn:schemas-microsoft-com:office:powerpoint" xmlns:com="http://schemas.openxmlformats.org/drawingml/2006/compatibility" xmlns:p14="http://schemas.microsoft.com/office/powerpoint/2010/main" showMasterPhAnim="0" showMasterSp="0">
-  <p:cSld>
-    <p:spTree>
-      <p:nvGrpSpPr>
-        <p:cNvPr id="447" name="Shape 447"/>
-        <p:cNvGrpSpPr/>
-        <p:nvPr/>
-      </p:nvGrpSpPr>
-      <p:grpSpPr>
-        <a:xfrm>
-          <a:off x="0" y="0"/>
-          <a:ext cx="0" cy="0"/>
-          <a:chOff x="0" y="0"/>
-          <a:chExt cx="0" cy="0"/>
-        </a:xfrm>
-      </p:grpSpPr>
-      <p:sp>
-        <p:nvSpPr>
           <p:cNvPr id="448" name="Shape 448"/>
-          <p:cNvSpPr/>
-          <p:nvPr>
-            <p:ph idx="2" type="sldImg"/>
-          </p:nvPr>
-        </p:nvSpPr>
-        <p:spPr>
-          <a:xfrm>
-            <a:off x="381175" y="685800"/>
-            <a:ext cx="6096299" cy="3429000"/>
-          </a:xfrm>
-          <a:custGeom>
-            <a:pathLst>
-              <a:path extrusionOk="0" h="120000" w="120000">
-                <a:moveTo>
-                  <a:pt x="0" y="0"/>
-                </a:moveTo>
-                <a:lnTo>
-                  <a:pt x="120000" y="0"/>
-                </a:lnTo>
-                <a:lnTo>
-                  <a:pt x="120000" y="120000"/>
-                </a:lnTo>
-                <a:lnTo>
-                  <a:pt x="0" y="120000"/>
-                </a:lnTo>
-                <a:close/>
-              </a:path>
-            </a:pathLst>
-          </a:custGeom>
-        </p:spPr>
-      </p:sp>
-      <p:sp>
-        <p:nvSpPr>
-          <p:cNvPr id="449" name="Shape 449"/>
           <p:cNvSpPr txBox="1"/>
           <p:nvPr>
             <p:ph idx="1" type="body"/>
@@ -851,7 +924,7 @@
   <p:cSld>
     <p:spTree>
       <p:nvGrpSpPr>
-        <p:cNvPr id="453" name="Shape 453"/>
+        <p:cNvPr id="451" name="Shape 451"/>
         <p:cNvGrpSpPr/>
         <p:nvPr/>
       </p:nvGrpSpPr>
@@ -865,7 +938,7 @@
       </p:grpSpPr>
       <p:sp>
         <p:nvSpPr>
-          <p:cNvPr id="454" name="Shape 454"/>
+          <p:cNvPr id="452" name="Shape 452"/>
           <p:cNvSpPr/>
           <p:nvPr>
             <p:ph idx="2" type="sldImg"/>
@@ -899,7 +972,292 @@
       </p:sp>
       <p:sp>
         <p:nvSpPr>
-          <p:cNvPr id="455" name="Shape 455"/>
+          <p:cNvPr id="453" name="Shape 453"/>
+          <p:cNvSpPr txBox="1"/>
+          <p:nvPr>
+            <p:ph idx="1" type="body"/>
+          </p:nvPr>
+        </p:nvSpPr>
+        <p:spPr>
+          <a:xfrm>
+            <a:off x="685800" y="4343400"/>
+            <a:ext cx="5486399" cy="4114800"/>
+          </a:xfrm>
+          <a:prstGeom prst="rect">
+            <a:avLst/>
+          </a:prstGeom>
+        </p:spPr>
+        <p:txBody>
+          <a:bodyPr anchorCtr="0" anchor="t" bIns="91425" lIns="91425" rIns="91425" tIns="91425">
+            <a:noAutofit/>
+          </a:bodyPr>
+          <a:lstStyle/>
+          <a:p>
+            <a:pPr lvl="0">
+              <a:spcBef>
+                <a:spcPts val="0"/>
+              </a:spcBef>
+              <a:buNone/>
+            </a:pPr>
+            <a:r>
+              <a:t/>
+            </a:r>
+            <a:endParaRPr/>
+          </a:p>
+        </p:txBody>
+      </p:sp>
+    </p:spTree>
+  </p:cSld>
+  <p:clrMapOvr>
+    <a:masterClrMapping/>
+  </p:clrMapOvr>
+</p:notes>
+</file>
+
+<file path=ppt/notesSlides/notesSlide14.xml><?xml version="1.0" encoding="utf-8"?>
+<p:notes xmlns:a="http://schemas.openxmlformats.org/drawingml/2006/main" xmlns:r="http://schemas.openxmlformats.org/officeDocument/2006/relationships" xmlns:mc="http://schemas.openxmlformats.org/markup-compatibility/2006" xmlns:mv="urn:schemas-microsoft-com:mac:vml" xmlns:p="http://schemas.openxmlformats.org/presentationml/2006/main" xmlns:c="http://schemas.openxmlformats.org/drawingml/2006/chart" xmlns:dgm="http://schemas.openxmlformats.org/drawingml/2006/diagram" xmlns:o="urn:schemas-microsoft-com:office:office" xmlns:v="urn:schemas-microsoft-com:vml" xmlns:pvml="urn:schemas-microsoft-com:office:powerpoint" xmlns:com="http://schemas.openxmlformats.org/drawingml/2006/compatibility" xmlns:p14="http://schemas.microsoft.com/office/powerpoint/2010/main" showMasterPhAnim="0" showMasterSp="0">
+  <p:cSld>
+    <p:spTree>
+      <p:nvGrpSpPr>
+        <p:cNvPr id="457" name="Shape 457"/>
+        <p:cNvGrpSpPr/>
+        <p:nvPr/>
+      </p:nvGrpSpPr>
+      <p:grpSpPr>
+        <a:xfrm>
+          <a:off x="0" y="0"/>
+          <a:ext cx="0" cy="0"/>
+          <a:chOff x="0" y="0"/>
+          <a:chExt cx="0" cy="0"/>
+        </a:xfrm>
+      </p:grpSpPr>
+      <p:sp>
+        <p:nvSpPr>
+          <p:cNvPr id="458" name="Shape 458"/>
+          <p:cNvSpPr/>
+          <p:nvPr>
+            <p:ph idx="2" type="sldImg"/>
+          </p:nvPr>
+        </p:nvSpPr>
+        <p:spPr>
+          <a:xfrm>
+            <a:off x="381175" y="685800"/>
+            <a:ext cx="6096299" cy="3429000"/>
+          </a:xfrm>
+          <a:custGeom>
+            <a:pathLst>
+              <a:path extrusionOk="0" h="120000" w="120000">
+                <a:moveTo>
+                  <a:pt x="0" y="0"/>
+                </a:moveTo>
+                <a:lnTo>
+                  <a:pt x="120000" y="0"/>
+                </a:lnTo>
+                <a:lnTo>
+                  <a:pt x="120000" y="120000"/>
+                </a:lnTo>
+                <a:lnTo>
+                  <a:pt x="0" y="120000"/>
+                </a:lnTo>
+                <a:close/>
+              </a:path>
+            </a:pathLst>
+          </a:custGeom>
+        </p:spPr>
+      </p:sp>
+      <p:sp>
+        <p:nvSpPr>
+          <p:cNvPr id="459" name="Shape 459"/>
+          <p:cNvSpPr txBox="1"/>
+          <p:nvPr>
+            <p:ph idx="1" type="body"/>
+          </p:nvPr>
+        </p:nvSpPr>
+        <p:spPr>
+          <a:xfrm>
+            <a:off x="685800" y="4343400"/>
+            <a:ext cx="5486400" cy="4114800"/>
+          </a:xfrm>
+          <a:prstGeom prst="rect">
+            <a:avLst/>
+          </a:prstGeom>
+        </p:spPr>
+        <p:txBody>
+          <a:bodyPr anchorCtr="0" anchor="t" bIns="91425" lIns="91425" rIns="91425" tIns="91425">
+            <a:noAutofit/>
+          </a:bodyPr>
+          <a:lstStyle/>
+          <a:p>
+            <a:pPr lvl="0">
+              <a:spcBef>
+                <a:spcPts val="0"/>
+              </a:spcBef>
+              <a:buNone/>
+            </a:pPr>
+            <a:r>
+              <a:t/>
+            </a:r>
+            <a:endParaRPr/>
+          </a:p>
+        </p:txBody>
+      </p:sp>
+    </p:spTree>
+  </p:cSld>
+  <p:clrMapOvr>
+    <a:masterClrMapping/>
+  </p:clrMapOvr>
+</p:notes>
+</file>
+
+<file path=ppt/notesSlides/notesSlide15.xml><?xml version="1.0" encoding="utf-8"?>
+<p:notes xmlns:a="http://schemas.openxmlformats.org/drawingml/2006/main" xmlns:r="http://schemas.openxmlformats.org/officeDocument/2006/relationships" xmlns:mc="http://schemas.openxmlformats.org/markup-compatibility/2006" xmlns:mv="urn:schemas-microsoft-com:mac:vml" xmlns:p="http://schemas.openxmlformats.org/presentationml/2006/main" xmlns:c="http://schemas.openxmlformats.org/drawingml/2006/chart" xmlns:dgm="http://schemas.openxmlformats.org/drawingml/2006/diagram" xmlns:o="urn:schemas-microsoft-com:office:office" xmlns:v="urn:schemas-microsoft-com:vml" xmlns:pvml="urn:schemas-microsoft-com:office:powerpoint" xmlns:com="http://schemas.openxmlformats.org/drawingml/2006/compatibility" xmlns:p14="http://schemas.microsoft.com/office/powerpoint/2010/main" showMasterPhAnim="0" showMasterSp="0">
+  <p:cSld>
+    <p:spTree>
+      <p:nvGrpSpPr>
+        <p:cNvPr id="463" name="Shape 463"/>
+        <p:cNvGrpSpPr/>
+        <p:nvPr/>
+      </p:nvGrpSpPr>
+      <p:grpSpPr>
+        <a:xfrm>
+          <a:off x="0" y="0"/>
+          <a:ext cx="0" cy="0"/>
+          <a:chOff x="0" y="0"/>
+          <a:chExt cx="0" cy="0"/>
+        </a:xfrm>
+      </p:grpSpPr>
+      <p:sp>
+        <p:nvSpPr>
+          <p:cNvPr id="464" name="Shape 464"/>
+          <p:cNvSpPr/>
+          <p:nvPr>
+            <p:ph idx="2" type="sldImg"/>
+          </p:nvPr>
+        </p:nvSpPr>
+        <p:spPr>
+          <a:xfrm>
+            <a:off x="381175" y="685800"/>
+            <a:ext cx="6096299" cy="3429000"/>
+          </a:xfrm>
+          <a:custGeom>
+            <a:pathLst>
+              <a:path extrusionOk="0" h="120000" w="120000">
+                <a:moveTo>
+                  <a:pt x="0" y="0"/>
+                </a:moveTo>
+                <a:lnTo>
+                  <a:pt x="120000" y="0"/>
+                </a:lnTo>
+                <a:lnTo>
+                  <a:pt x="120000" y="120000"/>
+                </a:lnTo>
+                <a:lnTo>
+                  <a:pt x="0" y="120000"/>
+                </a:lnTo>
+                <a:close/>
+              </a:path>
+            </a:pathLst>
+          </a:custGeom>
+        </p:spPr>
+      </p:sp>
+      <p:sp>
+        <p:nvSpPr>
+          <p:cNvPr id="465" name="Shape 465"/>
+          <p:cNvSpPr txBox="1"/>
+          <p:nvPr>
+            <p:ph idx="1" type="body"/>
+          </p:nvPr>
+        </p:nvSpPr>
+        <p:spPr>
+          <a:xfrm>
+            <a:off x="685800" y="4343400"/>
+            <a:ext cx="5486400" cy="4114800"/>
+          </a:xfrm>
+          <a:prstGeom prst="rect">
+            <a:avLst/>
+          </a:prstGeom>
+        </p:spPr>
+        <p:txBody>
+          <a:bodyPr anchorCtr="0" anchor="t" bIns="91425" lIns="91425" rIns="91425" tIns="91425">
+            <a:noAutofit/>
+          </a:bodyPr>
+          <a:lstStyle/>
+          <a:p>
+            <a:pPr lvl="0">
+              <a:spcBef>
+                <a:spcPts val="0"/>
+              </a:spcBef>
+              <a:buNone/>
+            </a:pPr>
+            <a:r>
+              <a:t/>
+            </a:r>
+            <a:endParaRPr/>
+          </a:p>
+        </p:txBody>
+      </p:sp>
+    </p:spTree>
+  </p:cSld>
+  <p:clrMapOvr>
+    <a:masterClrMapping/>
+  </p:clrMapOvr>
+</p:notes>
+</file>
+
+<file path=ppt/notesSlides/notesSlide16.xml><?xml version="1.0" encoding="utf-8"?>
+<p:notes xmlns:a="http://schemas.openxmlformats.org/drawingml/2006/main" xmlns:r="http://schemas.openxmlformats.org/officeDocument/2006/relationships" xmlns:mc="http://schemas.openxmlformats.org/markup-compatibility/2006" xmlns:mv="urn:schemas-microsoft-com:mac:vml" xmlns:p="http://schemas.openxmlformats.org/presentationml/2006/main" xmlns:c="http://schemas.openxmlformats.org/drawingml/2006/chart" xmlns:dgm="http://schemas.openxmlformats.org/drawingml/2006/diagram" xmlns:o="urn:schemas-microsoft-com:office:office" xmlns:v="urn:schemas-microsoft-com:vml" xmlns:pvml="urn:schemas-microsoft-com:office:powerpoint" xmlns:com="http://schemas.openxmlformats.org/drawingml/2006/compatibility" xmlns:p14="http://schemas.microsoft.com/office/powerpoint/2010/main" showMasterPhAnim="0" showMasterSp="0">
+  <p:cSld>
+    <p:spTree>
+      <p:nvGrpSpPr>
+        <p:cNvPr id="468" name="Shape 468"/>
+        <p:cNvGrpSpPr/>
+        <p:nvPr/>
+      </p:nvGrpSpPr>
+      <p:grpSpPr>
+        <a:xfrm>
+          <a:off x="0" y="0"/>
+          <a:ext cx="0" cy="0"/>
+          <a:chOff x="0" y="0"/>
+          <a:chExt cx="0" cy="0"/>
+        </a:xfrm>
+      </p:grpSpPr>
+      <p:sp>
+        <p:nvSpPr>
+          <p:cNvPr id="469" name="Shape 469"/>
+          <p:cNvSpPr/>
+          <p:nvPr>
+            <p:ph idx="2" type="sldImg"/>
+          </p:nvPr>
+        </p:nvSpPr>
+        <p:spPr>
+          <a:xfrm>
+            <a:off x="381175" y="685800"/>
+            <a:ext cx="6096299" cy="3429000"/>
+          </a:xfrm>
+          <a:custGeom>
+            <a:pathLst>
+              <a:path extrusionOk="0" h="120000" w="120000">
+                <a:moveTo>
+                  <a:pt x="0" y="0"/>
+                </a:moveTo>
+                <a:lnTo>
+                  <a:pt x="120000" y="0"/>
+                </a:lnTo>
+                <a:lnTo>
+                  <a:pt x="120000" y="120000"/>
+                </a:lnTo>
+                <a:lnTo>
+                  <a:pt x="0" y="120000"/>
+                </a:lnTo>
+                <a:close/>
+              </a:path>
+            </a:pathLst>
+          </a:custGeom>
+        </p:spPr>
+      </p:sp>
+      <p:sp>
+        <p:nvSpPr>
+          <p:cNvPr id="470" name="Shape 470"/>
           <p:cNvSpPr txBox="1"/>
           <p:nvPr>
             <p:ph idx="1" type="body"/>
@@ -950,12 +1308,12 @@
 </p:notes>
 </file>
 
-<file path=ppt/notesSlides/notesSlide14.xml><?xml version="1.0" encoding="utf-8"?>
+<file path=ppt/notesSlides/notesSlide17.xml><?xml version="1.0" encoding="utf-8"?>
 <p:notes xmlns:a="http://schemas.openxmlformats.org/drawingml/2006/main" xmlns:r="http://schemas.openxmlformats.org/officeDocument/2006/relationships" xmlns:mc="http://schemas.openxmlformats.org/markup-compatibility/2006" xmlns:mv="urn:schemas-microsoft-com:mac:vml" xmlns:p="http://schemas.openxmlformats.org/presentationml/2006/main" xmlns:c="http://schemas.openxmlformats.org/drawingml/2006/chart" xmlns:dgm="http://schemas.openxmlformats.org/drawingml/2006/diagram" xmlns:o="urn:schemas-microsoft-com:office:office" xmlns:v="urn:schemas-microsoft-com:vml" xmlns:pvml="urn:schemas-microsoft-com:office:powerpoint" xmlns:com="http://schemas.openxmlformats.org/drawingml/2006/compatibility" xmlns:p14="http://schemas.microsoft.com/office/powerpoint/2010/main" showMasterPhAnim="0" showMasterSp="0">
   <p:cSld>
     <p:spTree>
       <p:nvGrpSpPr>
-        <p:cNvPr id="459" name="Shape 459"/>
+        <p:cNvPr id="474" name="Shape 474"/>
         <p:cNvGrpSpPr/>
         <p:nvPr/>
       </p:nvGrpSpPr>
@@ -969,7 +1327,7 @@
       </p:grpSpPr>
       <p:sp>
         <p:nvSpPr>
-          <p:cNvPr id="460" name="Shape 460"/>
+          <p:cNvPr id="475" name="Shape 475"/>
           <p:cNvSpPr/>
           <p:nvPr>
             <p:ph idx="2" type="sldImg"/>
@@ -1003,7 +1361,7 @@
       </p:sp>
       <p:sp>
         <p:nvSpPr>
-          <p:cNvPr id="461" name="Shape 461"/>
+          <p:cNvPr id="476" name="Shape 476"/>
           <p:cNvSpPr txBox="1"/>
           <p:nvPr>
             <p:ph idx="1" type="body"/>
@@ -1045,12 +1403,12 @@
 </p:notes>
 </file>
 
-<file path=ppt/notesSlides/notesSlide15.xml><?xml version="1.0" encoding="utf-8"?>
+<file path=ppt/notesSlides/notesSlide18.xml><?xml version="1.0" encoding="utf-8"?>
 <p:notes xmlns:a="http://schemas.openxmlformats.org/drawingml/2006/main" xmlns:r="http://schemas.openxmlformats.org/officeDocument/2006/relationships" xmlns:mc="http://schemas.openxmlformats.org/markup-compatibility/2006" xmlns:mv="urn:schemas-microsoft-com:mac:vml" xmlns:p="http://schemas.openxmlformats.org/presentationml/2006/main" xmlns:c="http://schemas.openxmlformats.org/drawingml/2006/chart" xmlns:dgm="http://schemas.openxmlformats.org/drawingml/2006/diagram" xmlns:o="urn:schemas-microsoft-com:office:office" xmlns:v="urn:schemas-microsoft-com:vml" xmlns:pvml="urn:schemas-microsoft-com:office:powerpoint" xmlns:com="http://schemas.openxmlformats.org/drawingml/2006/compatibility" xmlns:p14="http://schemas.microsoft.com/office/powerpoint/2010/main" showMasterPhAnim="0" showMasterSp="0">
   <p:cSld>
     <p:spTree>
       <p:nvGrpSpPr>
-        <p:cNvPr id="465" name="Shape 465"/>
+        <p:cNvPr id="480" name="Shape 480"/>
         <p:cNvGrpSpPr/>
         <p:nvPr/>
       </p:nvGrpSpPr>
@@ -1064,7 +1422,7 @@
       </p:grpSpPr>
       <p:sp>
         <p:nvSpPr>
-          <p:cNvPr id="466" name="Shape 466"/>
+          <p:cNvPr id="481" name="Shape 481"/>
           <p:cNvSpPr/>
           <p:nvPr>
             <p:ph idx="2" type="sldImg"/>
@@ -1098,7 +1456,7 @@
       </p:sp>
       <p:sp>
         <p:nvSpPr>
-          <p:cNvPr id="467" name="Shape 467"/>
+          <p:cNvPr id="482" name="Shape 482"/>
           <p:cNvSpPr txBox="1"/>
           <p:nvPr>
             <p:ph idx="1" type="body"/>
@@ -1140,12 +1498,12 @@
 </p:notes>
 </file>
 
-<file path=ppt/notesSlides/notesSlide16.xml><?xml version="1.0" encoding="utf-8"?>
+<file path=ppt/notesSlides/notesSlide19.xml><?xml version="1.0" encoding="utf-8"?>
 <p:notes xmlns:a="http://schemas.openxmlformats.org/drawingml/2006/main" xmlns:r="http://schemas.openxmlformats.org/officeDocument/2006/relationships" xmlns:mc="http://schemas.openxmlformats.org/markup-compatibility/2006" xmlns:mv="urn:schemas-microsoft-com:mac:vml" xmlns:p="http://schemas.openxmlformats.org/presentationml/2006/main" xmlns:c="http://schemas.openxmlformats.org/drawingml/2006/chart" xmlns:dgm="http://schemas.openxmlformats.org/drawingml/2006/diagram" xmlns:o="urn:schemas-microsoft-com:office:office" xmlns:v="urn:schemas-microsoft-com:vml" xmlns:pvml="urn:schemas-microsoft-com:office:powerpoint" xmlns:com="http://schemas.openxmlformats.org/drawingml/2006/compatibility" xmlns:p14="http://schemas.microsoft.com/office/powerpoint/2010/main" showMasterPhAnim="0" showMasterSp="0">
   <p:cSld>
     <p:spTree>
       <p:nvGrpSpPr>
-        <p:cNvPr id="470" name="Shape 470"/>
+        <p:cNvPr id="485" name="Shape 485"/>
         <p:cNvGrpSpPr/>
         <p:nvPr/>
       </p:nvGrpSpPr>
@@ -1159,7 +1517,7 @@
       </p:grpSpPr>
       <p:sp>
         <p:nvSpPr>
-          <p:cNvPr id="471" name="Shape 471"/>
+          <p:cNvPr id="486" name="Shape 486"/>
           <p:cNvSpPr/>
           <p:nvPr>
             <p:ph idx="2" type="sldImg"/>
@@ -1193,7 +1551,7 @@
       </p:sp>
       <p:sp>
         <p:nvSpPr>
-          <p:cNvPr id="472" name="Shape 472"/>
+          <p:cNvPr id="487" name="Shape 487"/>
           <p:cNvSpPr txBox="1"/>
           <p:nvPr>
             <p:ph idx="1" type="body"/>
@@ -1203,101 +1561,6 @@
           <a:xfrm>
             <a:off x="685800" y="4343400"/>
             <a:ext cx="5486400" cy="4114800"/>
-          </a:xfrm>
-          <a:prstGeom prst="rect">
-            <a:avLst/>
-          </a:prstGeom>
-        </p:spPr>
-        <p:txBody>
-          <a:bodyPr anchorCtr="0" anchor="t" bIns="91425" lIns="91425" rIns="91425" tIns="91425">
-            <a:noAutofit/>
-          </a:bodyPr>
-          <a:lstStyle/>
-          <a:p>
-            <a:pPr lvl="0">
-              <a:spcBef>
-                <a:spcPts val="0"/>
-              </a:spcBef>
-              <a:buNone/>
-            </a:pPr>
-            <a:r>
-              <a:t/>
-            </a:r>
-            <a:endParaRPr/>
-          </a:p>
-        </p:txBody>
-      </p:sp>
-    </p:spTree>
-  </p:cSld>
-  <p:clrMapOvr>
-    <a:masterClrMapping/>
-  </p:clrMapOvr>
-</p:notes>
-</file>
-
-<file path=ppt/notesSlides/notesSlide17.xml><?xml version="1.0" encoding="utf-8"?>
-<p:notes xmlns:a="http://schemas.openxmlformats.org/drawingml/2006/main" xmlns:r="http://schemas.openxmlformats.org/officeDocument/2006/relationships" xmlns:mc="http://schemas.openxmlformats.org/markup-compatibility/2006" xmlns:mv="urn:schemas-microsoft-com:mac:vml" xmlns:p="http://schemas.openxmlformats.org/presentationml/2006/main" xmlns:c="http://schemas.openxmlformats.org/drawingml/2006/chart" xmlns:dgm="http://schemas.openxmlformats.org/drawingml/2006/diagram" xmlns:o="urn:schemas-microsoft-com:office:office" xmlns:v="urn:schemas-microsoft-com:vml" xmlns:pvml="urn:schemas-microsoft-com:office:powerpoint" xmlns:com="http://schemas.openxmlformats.org/drawingml/2006/compatibility" xmlns:p14="http://schemas.microsoft.com/office/powerpoint/2010/main" showMasterPhAnim="0" showMasterSp="0">
-  <p:cSld>
-    <p:spTree>
-      <p:nvGrpSpPr>
-        <p:cNvPr id="476" name="Shape 476"/>
-        <p:cNvGrpSpPr/>
-        <p:nvPr/>
-      </p:nvGrpSpPr>
-      <p:grpSpPr>
-        <a:xfrm>
-          <a:off x="0" y="0"/>
-          <a:ext cx="0" cy="0"/>
-          <a:chOff x="0" y="0"/>
-          <a:chExt cx="0" cy="0"/>
-        </a:xfrm>
-      </p:grpSpPr>
-      <p:sp>
-        <p:nvSpPr>
-          <p:cNvPr id="477" name="Shape 477"/>
-          <p:cNvSpPr/>
-          <p:nvPr>
-            <p:ph idx="2" type="sldImg"/>
-          </p:nvPr>
-        </p:nvSpPr>
-        <p:spPr>
-          <a:xfrm>
-            <a:off x="381175" y="685800"/>
-            <a:ext cx="6096299" cy="3429000"/>
-          </a:xfrm>
-          <a:custGeom>
-            <a:pathLst>
-              <a:path extrusionOk="0" h="120000" w="120000">
-                <a:moveTo>
-                  <a:pt x="0" y="0"/>
-                </a:moveTo>
-                <a:lnTo>
-                  <a:pt x="120000" y="0"/>
-                </a:lnTo>
-                <a:lnTo>
-                  <a:pt x="120000" y="120000"/>
-                </a:lnTo>
-                <a:lnTo>
-                  <a:pt x="0" y="120000"/>
-                </a:lnTo>
-                <a:close/>
-              </a:path>
-            </a:pathLst>
-          </a:custGeom>
-        </p:spPr>
-      </p:sp>
-      <p:sp>
-        <p:nvSpPr>
-          <p:cNvPr id="478" name="Shape 478"/>
-          <p:cNvSpPr txBox="1"/>
-          <p:nvPr>
-            <p:ph idx="1" type="body"/>
-          </p:nvPr>
-        </p:nvSpPr>
-        <p:spPr>
-          <a:xfrm>
-            <a:off x="685800" y="4343400"/>
-            <a:ext cx="5486399" cy="4114800"/>
           </a:xfrm>
           <a:prstGeom prst="rect">
             <a:avLst/>
@@ -1384,6 +1647,196 @@
       <p:sp>
         <p:nvSpPr>
           <p:cNvPr id="380" name="Shape 380"/>
+          <p:cNvSpPr txBox="1"/>
+          <p:nvPr>
+            <p:ph idx="1" type="body"/>
+          </p:nvPr>
+        </p:nvSpPr>
+        <p:spPr>
+          <a:xfrm>
+            <a:off x="685800" y="4343400"/>
+            <a:ext cx="5486399" cy="4114800"/>
+          </a:xfrm>
+          <a:prstGeom prst="rect">
+            <a:avLst/>
+          </a:prstGeom>
+        </p:spPr>
+        <p:txBody>
+          <a:bodyPr anchorCtr="0" anchor="t" bIns="91425" lIns="91425" rIns="91425" tIns="91425">
+            <a:noAutofit/>
+          </a:bodyPr>
+          <a:lstStyle/>
+          <a:p>
+            <a:pPr lvl="0">
+              <a:spcBef>
+                <a:spcPts val="0"/>
+              </a:spcBef>
+              <a:buNone/>
+            </a:pPr>
+            <a:r>
+              <a:t/>
+            </a:r>
+            <a:endParaRPr/>
+          </a:p>
+        </p:txBody>
+      </p:sp>
+    </p:spTree>
+  </p:cSld>
+  <p:clrMapOvr>
+    <a:masterClrMapping/>
+  </p:clrMapOvr>
+</p:notes>
+</file>
+
+<file path=ppt/notesSlides/notesSlide20.xml><?xml version="1.0" encoding="utf-8"?>
+<p:notes xmlns:a="http://schemas.openxmlformats.org/drawingml/2006/main" xmlns:r="http://schemas.openxmlformats.org/officeDocument/2006/relationships" xmlns:mc="http://schemas.openxmlformats.org/markup-compatibility/2006" xmlns:mv="urn:schemas-microsoft-com:mac:vml" xmlns:p="http://schemas.openxmlformats.org/presentationml/2006/main" xmlns:c="http://schemas.openxmlformats.org/drawingml/2006/chart" xmlns:dgm="http://schemas.openxmlformats.org/drawingml/2006/diagram" xmlns:o="urn:schemas-microsoft-com:office:office" xmlns:v="urn:schemas-microsoft-com:vml" xmlns:pvml="urn:schemas-microsoft-com:office:powerpoint" xmlns:com="http://schemas.openxmlformats.org/drawingml/2006/compatibility" xmlns:p14="http://schemas.microsoft.com/office/powerpoint/2010/main" showMasterPhAnim="0" showMasterSp="0">
+  <p:cSld>
+    <p:spTree>
+      <p:nvGrpSpPr>
+        <p:cNvPr id="490" name="Shape 490"/>
+        <p:cNvGrpSpPr/>
+        <p:nvPr/>
+      </p:nvGrpSpPr>
+      <p:grpSpPr>
+        <a:xfrm>
+          <a:off x="0" y="0"/>
+          <a:ext cx="0" cy="0"/>
+          <a:chOff x="0" y="0"/>
+          <a:chExt cx="0" cy="0"/>
+        </a:xfrm>
+      </p:grpSpPr>
+      <p:sp>
+        <p:nvSpPr>
+          <p:cNvPr id="491" name="Shape 491"/>
+          <p:cNvSpPr/>
+          <p:nvPr>
+            <p:ph idx="2" type="sldImg"/>
+          </p:nvPr>
+        </p:nvSpPr>
+        <p:spPr>
+          <a:xfrm>
+            <a:off x="381175" y="685800"/>
+            <a:ext cx="6096299" cy="3429000"/>
+          </a:xfrm>
+          <a:custGeom>
+            <a:pathLst>
+              <a:path extrusionOk="0" h="120000" w="120000">
+                <a:moveTo>
+                  <a:pt x="0" y="0"/>
+                </a:moveTo>
+                <a:lnTo>
+                  <a:pt x="120000" y="0"/>
+                </a:lnTo>
+                <a:lnTo>
+                  <a:pt x="120000" y="120000"/>
+                </a:lnTo>
+                <a:lnTo>
+                  <a:pt x="0" y="120000"/>
+                </a:lnTo>
+                <a:close/>
+              </a:path>
+            </a:pathLst>
+          </a:custGeom>
+        </p:spPr>
+      </p:sp>
+      <p:sp>
+        <p:nvSpPr>
+          <p:cNvPr id="492" name="Shape 492"/>
+          <p:cNvSpPr txBox="1"/>
+          <p:nvPr>
+            <p:ph idx="1" type="body"/>
+          </p:nvPr>
+        </p:nvSpPr>
+        <p:spPr>
+          <a:xfrm>
+            <a:off x="685800" y="4343400"/>
+            <a:ext cx="5486400" cy="4114800"/>
+          </a:xfrm>
+          <a:prstGeom prst="rect">
+            <a:avLst/>
+          </a:prstGeom>
+        </p:spPr>
+        <p:txBody>
+          <a:bodyPr anchorCtr="0" anchor="t" bIns="91425" lIns="91425" rIns="91425" tIns="91425">
+            <a:noAutofit/>
+          </a:bodyPr>
+          <a:lstStyle/>
+          <a:p>
+            <a:pPr lvl="0">
+              <a:spcBef>
+                <a:spcPts val="0"/>
+              </a:spcBef>
+              <a:buNone/>
+            </a:pPr>
+            <a:r>
+              <a:t/>
+            </a:r>
+            <a:endParaRPr/>
+          </a:p>
+        </p:txBody>
+      </p:sp>
+    </p:spTree>
+  </p:cSld>
+  <p:clrMapOvr>
+    <a:masterClrMapping/>
+  </p:clrMapOvr>
+</p:notes>
+</file>
+
+<file path=ppt/notesSlides/notesSlide21.xml><?xml version="1.0" encoding="utf-8"?>
+<p:notes xmlns:a="http://schemas.openxmlformats.org/drawingml/2006/main" xmlns:r="http://schemas.openxmlformats.org/officeDocument/2006/relationships" xmlns:mc="http://schemas.openxmlformats.org/markup-compatibility/2006" xmlns:mv="urn:schemas-microsoft-com:mac:vml" xmlns:p="http://schemas.openxmlformats.org/presentationml/2006/main" xmlns:c="http://schemas.openxmlformats.org/drawingml/2006/chart" xmlns:dgm="http://schemas.openxmlformats.org/drawingml/2006/diagram" xmlns:o="urn:schemas-microsoft-com:office:office" xmlns:v="urn:schemas-microsoft-com:vml" xmlns:pvml="urn:schemas-microsoft-com:office:powerpoint" xmlns:com="http://schemas.openxmlformats.org/drawingml/2006/compatibility" xmlns:p14="http://schemas.microsoft.com/office/powerpoint/2010/main" showMasterPhAnim="0" showMasterSp="0">
+  <p:cSld>
+    <p:spTree>
+      <p:nvGrpSpPr>
+        <p:cNvPr id="496" name="Shape 496"/>
+        <p:cNvGrpSpPr/>
+        <p:nvPr/>
+      </p:nvGrpSpPr>
+      <p:grpSpPr>
+        <a:xfrm>
+          <a:off x="0" y="0"/>
+          <a:ext cx="0" cy="0"/>
+          <a:chOff x="0" y="0"/>
+          <a:chExt cx="0" cy="0"/>
+        </a:xfrm>
+      </p:grpSpPr>
+      <p:sp>
+        <p:nvSpPr>
+          <p:cNvPr id="497" name="Shape 497"/>
+          <p:cNvSpPr/>
+          <p:nvPr>
+            <p:ph idx="2" type="sldImg"/>
+          </p:nvPr>
+        </p:nvSpPr>
+        <p:spPr>
+          <a:xfrm>
+            <a:off x="381175" y="685800"/>
+            <a:ext cx="6096299" cy="3429000"/>
+          </a:xfrm>
+          <a:custGeom>
+            <a:pathLst>
+              <a:path extrusionOk="0" h="120000" w="120000">
+                <a:moveTo>
+                  <a:pt x="0" y="0"/>
+                </a:moveTo>
+                <a:lnTo>
+                  <a:pt x="120000" y="0"/>
+                </a:lnTo>
+                <a:lnTo>
+                  <a:pt x="120000" y="120000"/>
+                </a:lnTo>
+                <a:lnTo>
+                  <a:pt x="0" y="120000"/>
+                </a:lnTo>
+                <a:close/>
+              </a:path>
+            </a:pathLst>
+          </a:custGeom>
+        </p:spPr>
+      </p:sp>
+      <p:sp>
+        <p:nvSpPr>
+          <p:cNvPr id="498" name="Shape 498"/>
           <p:cNvSpPr txBox="1"/>
           <p:nvPr>
             <p:ph idx="1" type="body"/>
@@ -1677,7 +2130,7 @@
         <p:spPr>
           <a:xfrm>
             <a:off x="685800" y="4343400"/>
-            <a:ext cx="5486399" cy="4114800"/>
+            <a:ext cx="5486400" cy="4114800"/>
           </a:xfrm>
           <a:prstGeom prst="rect">
             <a:avLst/>
@@ -1715,7 +2168,7 @@
   <p:cSld>
     <p:spTree>
       <p:nvGrpSpPr>
-        <p:cNvPr id="402" name="Shape 402"/>
+        <p:cNvPr id="401" name="Shape 401"/>
         <p:cNvGrpSpPr/>
         <p:nvPr/>
       </p:nvGrpSpPr>
@@ -1729,7 +2182,7 @@
       </p:grpSpPr>
       <p:sp>
         <p:nvSpPr>
-          <p:cNvPr id="403" name="Shape 403"/>
+          <p:cNvPr id="402" name="Shape 402"/>
           <p:cNvSpPr/>
           <p:nvPr>
             <p:ph idx="2" type="sldImg"/>
@@ -1763,7 +2216,7 @@
       </p:sp>
       <p:sp>
         <p:nvSpPr>
-          <p:cNvPr id="404" name="Shape 404"/>
+          <p:cNvPr id="403" name="Shape 403"/>
           <p:cNvSpPr txBox="1"/>
           <p:nvPr>
             <p:ph idx="1" type="body"/>
@@ -1810,7 +2263,7 @@
   <p:cSld>
     <p:spTree>
       <p:nvGrpSpPr>
-        <p:cNvPr id="420" name="Shape 420"/>
+        <p:cNvPr id="407" name="Shape 407"/>
         <p:cNvGrpSpPr/>
         <p:nvPr/>
       </p:nvGrpSpPr>
@@ -1824,7 +2277,7 @@
       </p:grpSpPr>
       <p:sp>
         <p:nvSpPr>
-          <p:cNvPr id="421" name="Shape 421"/>
+          <p:cNvPr id="408" name="Shape 408"/>
           <p:cNvSpPr/>
           <p:nvPr>
             <p:ph idx="2" type="sldImg"/>
@@ -1858,7 +2311,102 @@
       </p:sp>
       <p:sp>
         <p:nvSpPr>
-          <p:cNvPr id="422" name="Shape 422"/>
+          <p:cNvPr id="409" name="Shape 409"/>
+          <p:cNvSpPr txBox="1"/>
+          <p:nvPr>
+            <p:ph idx="1" type="body"/>
+          </p:nvPr>
+        </p:nvSpPr>
+        <p:spPr>
+          <a:xfrm>
+            <a:off x="685800" y="4343400"/>
+            <a:ext cx="5486399" cy="4114800"/>
+          </a:xfrm>
+          <a:prstGeom prst="rect">
+            <a:avLst/>
+          </a:prstGeom>
+        </p:spPr>
+        <p:txBody>
+          <a:bodyPr anchorCtr="0" anchor="t" bIns="91425" lIns="91425" rIns="91425" tIns="91425">
+            <a:noAutofit/>
+          </a:bodyPr>
+          <a:lstStyle/>
+          <a:p>
+            <a:pPr lvl="0">
+              <a:spcBef>
+                <a:spcPts val="0"/>
+              </a:spcBef>
+              <a:buNone/>
+            </a:pPr>
+            <a:r>
+              <a:t/>
+            </a:r>
+            <a:endParaRPr/>
+          </a:p>
+        </p:txBody>
+      </p:sp>
+    </p:spTree>
+  </p:cSld>
+  <p:clrMapOvr>
+    <a:masterClrMapping/>
+  </p:clrMapOvr>
+</p:notes>
+</file>
+
+<file path=ppt/notesSlides/notesSlide8.xml><?xml version="1.0" encoding="utf-8"?>
+<p:notes xmlns:a="http://schemas.openxmlformats.org/drawingml/2006/main" xmlns:r="http://schemas.openxmlformats.org/officeDocument/2006/relationships" xmlns:mc="http://schemas.openxmlformats.org/markup-compatibility/2006" xmlns:mv="urn:schemas-microsoft-com:mac:vml" xmlns:p="http://schemas.openxmlformats.org/presentationml/2006/main" xmlns:c="http://schemas.openxmlformats.org/drawingml/2006/chart" xmlns:dgm="http://schemas.openxmlformats.org/drawingml/2006/diagram" xmlns:o="urn:schemas-microsoft-com:office:office" xmlns:v="urn:schemas-microsoft-com:vml" xmlns:pvml="urn:schemas-microsoft-com:office:powerpoint" xmlns:com="http://schemas.openxmlformats.org/drawingml/2006/compatibility" xmlns:p14="http://schemas.microsoft.com/office/powerpoint/2010/main" showMasterPhAnim="0" showMasterSp="0">
+  <p:cSld>
+    <p:spTree>
+      <p:nvGrpSpPr>
+        <p:cNvPr id="425" name="Shape 425"/>
+        <p:cNvGrpSpPr/>
+        <p:nvPr/>
+      </p:nvGrpSpPr>
+      <p:grpSpPr>
+        <a:xfrm>
+          <a:off x="0" y="0"/>
+          <a:ext cx="0" cy="0"/>
+          <a:chOff x="0" y="0"/>
+          <a:chExt cx="0" cy="0"/>
+        </a:xfrm>
+      </p:grpSpPr>
+      <p:sp>
+        <p:nvSpPr>
+          <p:cNvPr id="426" name="Shape 426"/>
+          <p:cNvSpPr/>
+          <p:nvPr>
+            <p:ph idx="2" type="sldImg"/>
+          </p:nvPr>
+        </p:nvSpPr>
+        <p:spPr>
+          <a:xfrm>
+            <a:off x="381175" y="685800"/>
+            <a:ext cx="6096299" cy="3429000"/>
+          </a:xfrm>
+          <a:custGeom>
+            <a:pathLst>
+              <a:path extrusionOk="0" h="120000" w="120000">
+                <a:moveTo>
+                  <a:pt x="0" y="0"/>
+                </a:moveTo>
+                <a:lnTo>
+                  <a:pt x="120000" y="0"/>
+                </a:lnTo>
+                <a:lnTo>
+                  <a:pt x="120000" y="120000"/>
+                </a:lnTo>
+                <a:lnTo>
+                  <a:pt x="0" y="120000"/>
+                </a:lnTo>
+                <a:close/>
+              </a:path>
+            </a:pathLst>
+          </a:custGeom>
+        </p:spPr>
+      </p:sp>
+      <p:sp>
+        <p:nvSpPr>
+          <p:cNvPr id="427" name="Shape 427"/>
           <p:cNvSpPr txBox="1"/>
           <p:nvPr>
             <p:ph idx="1" type="body"/>
@@ -1968,101 +2516,6 @@
 </p:notes>
 </file>
 
-<file path=ppt/notesSlides/notesSlide8.xml><?xml version="1.0" encoding="utf-8"?>
-<p:notes xmlns:a="http://schemas.openxmlformats.org/drawingml/2006/main" xmlns:r="http://schemas.openxmlformats.org/officeDocument/2006/relationships" xmlns:mc="http://schemas.openxmlformats.org/markup-compatibility/2006" xmlns:mv="urn:schemas-microsoft-com:mac:vml" xmlns:p="http://schemas.openxmlformats.org/presentationml/2006/main" xmlns:c="http://schemas.openxmlformats.org/drawingml/2006/chart" xmlns:dgm="http://schemas.openxmlformats.org/drawingml/2006/diagram" xmlns:o="urn:schemas-microsoft-com:office:office" xmlns:v="urn:schemas-microsoft-com:vml" xmlns:pvml="urn:schemas-microsoft-com:office:powerpoint" xmlns:com="http://schemas.openxmlformats.org/drawingml/2006/compatibility" xmlns:p14="http://schemas.microsoft.com/office/powerpoint/2010/main" showMasterPhAnim="0" showMasterSp="0">
-  <p:cSld>
-    <p:spTree>
-      <p:nvGrpSpPr>
-        <p:cNvPr id="426" name="Shape 426"/>
-        <p:cNvGrpSpPr/>
-        <p:nvPr/>
-      </p:nvGrpSpPr>
-      <p:grpSpPr>
-        <a:xfrm>
-          <a:off x="0" y="0"/>
-          <a:ext cx="0" cy="0"/>
-          <a:chOff x="0" y="0"/>
-          <a:chExt cx="0" cy="0"/>
-        </a:xfrm>
-      </p:grpSpPr>
-      <p:sp>
-        <p:nvSpPr>
-          <p:cNvPr id="427" name="Shape 427"/>
-          <p:cNvSpPr/>
-          <p:nvPr>
-            <p:ph idx="2" type="sldImg"/>
-          </p:nvPr>
-        </p:nvSpPr>
-        <p:spPr>
-          <a:xfrm>
-            <a:off x="381175" y="685800"/>
-            <a:ext cx="6096299" cy="3429000"/>
-          </a:xfrm>
-          <a:custGeom>
-            <a:pathLst>
-              <a:path extrusionOk="0" h="120000" w="120000">
-                <a:moveTo>
-                  <a:pt x="0" y="0"/>
-                </a:moveTo>
-                <a:lnTo>
-                  <a:pt x="120000" y="0"/>
-                </a:lnTo>
-                <a:lnTo>
-                  <a:pt x="120000" y="120000"/>
-                </a:lnTo>
-                <a:lnTo>
-                  <a:pt x="0" y="120000"/>
-                </a:lnTo>
-                <a:close/>
-              </a:path>
-            </a:pathLst>
-          </a:custGeom>
-        </p:spPr>
-      </p:sp>
-      <p:sp>
-        <p:nvSpPr>
-          <p:cNvPr id="428" name="Shape 428"/>
-          <p:cNvSpPr txBox="1"/>
-          <p:nvPr>
-            <p:ph idx="1" type="body"/>
-          </p:nvPr>
-        </p:nvSpPr>
-        <p:spPr>
-          <a:xfrm>
-            <a:off x="685800" y="4343400"/>
-            <a:ext cx="5486399" cy="4114800"/>
-          </a:xfrm>
-          <a:prstGeom prst="rect">
-            <a:avLst/>
-          </a:prstGeom>
-        </p:spPr>
-        <p:txBody>
-          <a:bodyPr anchorCtr="0" anchor="t" bIns="91425" lIns="91425" rIns="91425" tIns="91425">
-            <a:noAutofit/>
-          </a:bodyPr>
-          <a:lstStyle/>
-          <a:p>
-            <a:pPr lvl="0">
-              <a:spcBef>
-                <a:spcPts val="0"/>
-              </a:spcBef>
-              <a:buNone/>
-            </a:pPr>
-            <a:r>
-              <a:t/>
-            </a:r>
-            <a:endParaRPr/>
-          </a:p>
-        </p:txBody>
-      </p:sp>
-    </p:spTree>
-  </p:cSld>
-  <p:clrMapOvr>
-    <a:masterClrMapping/>
-  </p:clrMapOvr>
-</p:notes>
-</file>
-
 <file path=ppt/notesSlides/notesSlide9.xml><?xml version="1.0" encoding="utf-8"?>
 <p:notes xmlns:a="http://schemas.openxmlformats.org/drawingml/2006/main" xmlns:r="http://schemas.openxmlformats.org/officeDocument/2006/relationships" xmlns:mc="http://schemas.openxmlformats.org/markup-compatibility/2006" xmlns:mv="urn:schemas-microsoft-com:mac:vml" xmlns:p="http://schemas.openxmlformats.org/presentationml/2006/main" xmlns:c="http://schemas.openxmlformats.org/drawingml/2006/chart" xmlns:dgm="http://schemas.openxmlformats.org/drawingml/2006/diagram" xmlns:o="urn:schemas-microsoft-com:office:office" xmlns:v="urn:schemas-microsoft-com:vml" xmlns:pvml="urn:schemas-microsoft-com:office:powerpoint" xmlns:com="http://schemas.openxmlformats.org/drawingml/2006/compatibility" xmlns:p14="http://schemas.microsoft.com/office/powerpoint/2010/main" showMasterPhAnim="0" showMasterSp="0">
   <p:cSld>
@@ -2136,75 +2589,6 @@
             <a:noAutofit/>
           </a:bodyPr>
           <a:lstStyle/>
-          <a:p>
-            <a:pPr lvl="0" rtl="0">
-              <a:lnSpc>
-                <a:spcPct val="115000"/>
-              </a:lnSpc>
-              <a:spcBef>
-                <a:spcPts val="1500"/>
-              </a:spcBef>
-              <a:buClr>
-                <a:schemeClr val="dk1"/>
-              </a:buClr>
-              <a:buSzPct val="91666"/>
-              <a:buFont typeface="Arial"/>
-              <a:buNone/>
-            </a:pPr>
-            <a:r>
-              <a:rPr lang="en" sz="1200">
-                <a:solidFill>
-                  <a:srgbClr val="1D2021"/>
-                </a:solidFill>
-              </a:rPr>
-              <a:t>Logo, existem várias ferramentas e frameworks que apoiam esta fase do BDD, transformando esses requisitos em testes automatizados que ajudam a orientar o desenvolvedor para que a nova funcionalidade seja desenvolvida corretamente e dentro do prazo. </a:t>
-            </a:r>
-          </a:p>
-          <a:p>
-            <a:pPr indent="4845050" lvl="0" rtl="0">
-              <a:lnSpc>
-                <a:spcPct val="115000"/>
-              </a:lnSpc>
-              <a:spcBef>
-                <a:spcPts val="0"/>
-              </a:spcBef>
-              <a:buClr>
-                <a:schemeClr val="dk1"/>
-              </a:buClr>
-              <a:buSzPct val="91666"/>
-              <a:buFont typeface="Arial"/>
-              <a:buNone/>
-            </a:pPr>
-            <a:r>
-              <a:t/>
-            </a:r>
-            <a:endParaRPr sz="1200">
-              <a:solidFill>
-                <a:srgbClr val="1D2021"/>
-              </a:solidFill>
-            </a:endParaRPr>
-          </a:p>
-          <a:p>
-            <a:pPr lvl="0">
-              <a:spcBef>
-                <a:spcPts val="0"/>
-              </a:spcBef>
-              <a:buClr>
-                <a:schemeClr val="dk1"/>
-              </a:buClr>
-              <a:buSzPct val="100000"/>
-              <a:buFont typeface="Arial"/>
-              <a:buNone/>
-            </a:pPr>
-            <a:r>
-              <a:t/>
-            </a:r>
-            <a:endParaRPr>
-              <a:solidFill>
-                <a:schemeClr val="dk1"/>
-              </a:solidFill>
-            </a:endParaRPr>
-          </a:p>
           <a:p>
             <a:pPr lvl="0">
               <a:spcBef>
@@ -44186,6 +44570,18 @@
             </a:pPr>
             <a:r>
               <a:rPr lang="en"/>
+              <a:t>Treinamento</a:t>
+            </a:r>
+          </a:p>
+          <a:p>
+            <a:pPr lvl="0">
+              <a:spcBef>
+                <a:spcPts val="0"/>
+              </a:spcBef>
+              <a:buNone/>
+            </a:pPr>
+            <a:r>
+              <a:rPr lang="en"/>
               <a:t>BDD</a:t>
             </a:r>
           </a:p>
@@ -44202,6 +44598,225 @@
 <file path=ppt/slides/slide10.xml><?xml version="1.0" encoding="utf-8"?>
 <p:sld xmlns:a="http://schemas.openxmlformats.org/drawingml/2006/main" xmlns:r="http://schemas.openxmlformats.org/officeDocument/2006/relationships" xmlns:mc="http://schemas.openxmlformats.org/markup-compatibility/2006" xmlns:mv="urn:schemas-microsoft-com:mac:vml" xmlns:p="http://schemas.openxmlformats.org/presentationml/2006/main" xmlns:c="http://schemas.openxmlformats.org/drawingml/2006/chart" xmlns:dgm="http://schemas.openxmlformats.org/drawingml/2006/diagram" xmlns:o="urn:schemas-microsoft-com:office:office" xmlns:v="urn:schemas-microsoft-com:vml" xmlns:pvml="urn:schemas-microsoft-com:office:powerpoint" xmlns:com="http://schemas.openxmlformats.org/drawingml/2006/compatibility" xmlns:p14="http://schemas.microsoft.com/office/powerpoint/2010/main">
   <p:cSld>
+    <p:spTree>
+      <p:nvGrpSpPr>
+        <p:cNvPr id="439" name="Shape 439"/>
+        <p:cNvGrpSpPr/>
+        <p:nvPr/>
+      </p:nvGrpSpPr>
+      <p:grpSpPr>
+        <a:xfrm>
+          <a:off x="0" y="0"/>
+          <a:ext cx="0" cy="0"/>
+          <a:chOff x="0" y="0"/>
+          <a:chExt cx="0" cy="0"/>
+        </a:xfrm>
+      </p:grpSpPr>
+      <p:sp>
+        <p:nvSpPr>
+          <p:cNvPr id="440" name="Shape 440"/>
+          <p:cNvSpPr txBox="1"/>
+          <p:nvPr>
+            <p:ph type="title"/>
+          </p:nvPr>
+        </p:nvSpPr>
+        <p:spPr>
+          <a:xfrm>
+            <a:off x="144075" y="559475"/>
+            <a:ext cx="2142000" cy="2630400"/>
+          </a:xfrm>
+          <a:prstGeom prst="rect">
+            <a:avLst/>
+          </a:prstGeom>
+        </p:spPr>
+        <p:txBody>
+          <a:bodyPr anchorCtr="0" anchor="ctr" bIns="91425" lIns="91425" rIns="91425" tIns="91425">
+            <a:noAutofit/>
+          </a:bodyPr>
+          <a:lstStyle/>
+          <a:p>
+            <a:pPr lvl="0" rtl="0">
+              <a:spcBef>
+                <a:spcPts val="0"/>
+              </a:spcBef>
+              <a:buNone/>
+            </a:pPr>
+            <a:r>
+              <a:rPr lang="en"/>
+              <a:t>E a equipe </a:t>
+            </a:r>
+            <a:r>
+              <a:rPr lang="en"/>
+              <a:t>identificou</a:t>
+            </a:r>
+            <a:r>
+              <a:rPr lang="en"/>
+              <a:t> e especificou que:</a:t>
+            </a:r>
+          </a:p>
+        </p:txBody>
+      </p:sp>
+      <p:sp>
+        <p:nvSpPr>
+          <p:cNvPr id="441" name="Shape 441"/>
+          <p:cNvSpPr txBox="1"/>
+          <p:nvPr>
+            <p:ph idx="1" type="body"/>
+          </p:nvPr>
+        </p:nvSpPr>
+        <p:spPr>
+          <a:xfrm>
+            <a:off x="2998175" y="559475"/>
+            <a:ext cx="5491500" cy="3849300"/>
+          </a:xfrm>
+          <a:prstGeom prst="rect">
+            <a:avLst/>
+          </a:prstGeom>
+        </p:spPr>
+        <p:txBody>
+          <a:bodyPr anchorCtr="0" anchor="t" bIns="91425" lIns="91425" rIns="91425" tIns="91425">
+            <a:noAutofit/>
+          </a:bodyPr>
+          <a:lstStyle/>
+          <a:p>
+            <a:pPr lvl="0">
+              <a:spcBef>
+                <a:spcPts val="0"/>
+              </a:spcBef>
+              <a:buNone/>
+            </a:pPr>
+            <a:r>
+              <a:rPr b="1" lang="en" sz="1800">
+                <a:latin typeface="Lato"/>
+                <a:ea typeface="Lato"/>
+                <a:cs typeface="Lato"/>
+                <a:sym typeface="Lato"/>
+              </a:rPr>
+              <a:t>Cenário: </a:t>
+            </a:r>
+            <a:r>
+              <a:rPr lang="en" sz="1800"/>
+              <a:t>Transferir dinheiro para uma conta poupança</a:t>
+            </a:r>
+          </a:p>
+          <a:p>
+            <a:pPr lvl="0">
+              <a:spcBef>
+                <a:spcPts val="0"/>
+              </a:spcBef>
+              <a:buNone/>
+            </a:pPr>
+            <a:r>
+              <a:rPr b="1" lang="en" sz="1800">
+                <a:latin typeface="Lato"/>
+                <a:ea typeface="Lato"/>
+                <a:cs typeface="Lato"/>
+                <a:sym typeface="Lato"/>
+              </a:rPr>
+              <a:t>Dado </a:t>
+            </a:r>
+            <a:r>
+              <a:rPr lang="en" sz="1800"/>
+              <a:t>que eu tenho uma conta corrente com R$ 1000 </a:t>
+            </a:r>
+          </a:p>
+          <a:p>
+            <a:pPr lvl="0">
+              <a:spcBef>
+                <a:spcPts val="0"/>
+              </a:spcBef>
+              <a:buNone/>
+            </a:pPr>
+            <a:r>
+              <a:rPr b="1" lang="en" sz="1800">
+                <a:latin typeface="Lato"/>
+                <a:ea typeface="Lato"/>
+                <a:cs typeface="Lato"/>
+                <a:sym typeface="Lato"/>
+              </a:rPr>
+              <a:t>E </a:t>
+            </a:r>
+            <a:r>
+              <a:rPr lang="en" sz="1800"/>
+              <a:t> que eu tenha uma conta poupança com R$ 2000</a:t>
+            </a:r>
+          </a:p>
+          <a:p>
+            <a:pPr lvl="0">
+              <a:spcBef>
+                <a:spcPts val="0"/>
+              </a:spcBef>
+              <a:buNone/>
+            </a:pPr>
+            <a:r>
+              <a:rPr b="1" lang="en" sz="1800">
+                <a:latin typeface="Lato"/>
+                <a:ea typeface="Lato"/>
+                <a:cs typeface="Lato"/>
+                <a:sym typeface="Lato"/>
+              </a:rPr>
+              <a:t>Quando </a:t>
+            </a:r>
+            <a:r>
+              <a:rPr lang="en" sz="1800"/>
+              <a:t>eu transferir R$ 500 para a minha conta poupança</a:t>
+            </a:r>
+          </a:p>
+          <a:p>
+            <a:pPr lvl="0">
+              <a:spcBef>
+                <a:spcPts val="0"/>
+              </a:spcBef>
+              <a:buNone/>
+            </a:pPr>
+            <a:r>
+              <a:rPr b="1" lang="en" sz="1800">
+                <a:latin typeface="Lato"/>
+                <a:ea typeface="Lato"/>
+                <a:cs typeface="Lato"/>
+                <a:sym typeface="Lato"/>
+              </a:rPr>
+              <a:t>Então </a:t>
+            </a:r>
+            <a:r>
+              <a:rPr lang="en" sz="1800"/>
+              <a:t>eu deveria ter R$ 500 em minha conta corrente</a:t>
+            </a:r>
+          </a:p>
+          <a:p>
+            <a:pPr lvl="0" rtl="0">
+              <a:spcBef>
+                <a:spcPts val="0"/>
+              </a:spcBef>
+              <a:buNone/>
+            </a:pPr>
+            <a:r>
+              <a:rPr b="1" lang="en" sz="1800">
+                <a:latin typeface="Lato"/>
+                <a:ea typeface="Lato"/>
+                <a:cs typeface="Lato"/>
+                <a:sym typeface="Lato"/>
+              </a:rPr>
+              <a:t>E </a:t>
+            </a:r>
+            <a:r>
+              <a:rPr lang="en" sz="1800"/>
+              <a:t>eu deveria ter R$ 2500 em minha conta poupança.</a:t>
+            </a:r>
+          </a:p>
+        </p:txBody>
+      </p:sp>
+    </p:spTree>
+  </p:cSld>
+  <p:clrMapOvr>
+    <a:masterClrMapping/>
+  </p:clrMapOvr>
+</p:sld>
+</file>
+
+<file path=ppt/slides/slide11.xml><?xml version="1.0" encoding="utf-8"?>
+<p:sld xmlns:a="http://schemas.openxmlformats.org/drawingml/2006/main" xmlns:r="http://schemas.openxmlformats.org/officeDocument/2006/relationships" xmlns:mc="http://schemas.openxmlformats.org/markup-compatibility/2006" xmlns:mv="urn:schemas-microsoft-com:mac:vml" xmlns:p="http://schemas.openxmlformats.org/presentationml/2006/main" xmlns:c="http://schemas.openxmlformats.org/drawingml/2006/chart" xmlns:dgm="http://schemas.openxmlformats.org/drawingml/2006/diagram" xmlns:o="urn:schemas-microsoft-com:office:office" xmlns:v="urn:schemas-microsoft-com:vml" xmlns:pvml="urn:schemas-microsoft-com:office:powerpoint" xmlns:com="http://schemas.openxmlformats.org/drawingml/2006/compatibility" xmlns:p14="http://schemas.microsoft.com/office/powerpoint/2010/main">
+  <p:cSld>
     <p:bg>
       <p:bgPr>
         <a:blipFill>
@@ -44216,7 +44831,7 @@
     </p:bg>
     <p:spTree>
       <p:nvGrpSpPr>
-        <p:cNvPr id="440" name="Shape 440"/>
+        <p:cNvPr id="445" name="Shape 445"/>
         <p:cNvGrpSpPr/>
         <p:nvPr/>
       </p:nvGrpSpPr>
@@ -44236,12 +44851,12 @@
 </p:sld>
 </file>
 
-<file path=ppt/slides/slide11.xml><?xml version="1.0" encoding="utf-8"?>
+<file path=ppt/slides/slide12.xml><?xml version="1.0" encoding="utf-8"?>
 <p:sld xmlns:a="http://schemas.openxmlformats.org/drawingml/2006/main" xmlns:r="http://schemas.openxmlformats.org/officeDocument/2006/relationships" xmlns:mc="http://schemas.openxmlformats.org/markup-compatibility/2006" xmlns:mv="urn:schemas-microsoft-com:mac:vml" xmlns:p="http://schemas.openxmlformats.org/presentationml/2006/main" xmlns:c="http://schemas.openxmlformats.org/drawingml/2006/chart" xmlns:dgm="http://schemas.openxmlformats.org/drawingml/2006/diagram" xmlns:o="urn:schemas-microsoft-com:office:office" xmlns:v="urn:schemas-microsoft-com:vml" xmlns:pvml="urn:schemas-microsoft-com:office:powerpoint" xmlns:com="http://schemas.openxmlformats.org/drawingml/2006/compatibility" xmlns:p14="http://schemas.microsoft.com/office/powerpoint/2010/main">
   <p:cSld>
     <p:spTree>
       <p:nvGrpSpPr>
-        <p:cNvPr id="444" name="Shape 444"/>
+        <p:cNvPr id="449" name="Shape 449"/>
         <p:cNvGrpSpPr/>
         <p:nvPr/>
       </p:nvGrpSpPr>
@@ -44255,7 +44870,102 @@
       </p:grpSpPr>
       <p:sp>
         <p:nvSpPr>
-          <p:cNvPr id="445" name="Shape 445"/>
+          <p:cNvPr id="450" name="Shape 450"/>
+          <p:cNvSpPr txBox="1"/>
+          <p:nvPr>
+            <p:ph idx="1" type="body"/>
+          </p:nvPr>
+        </p:nvSpPr>
+        <p:spPr>
+          <a:xfrm>
+            <a:off x="1242275" y="1704600"/>
+            <a:ext cx="6659700" cy="819900"/>
+          </a:xfrm>
+          <a:prstGeom prst="rect">
+            <a:avLst/>
+          </a:prstGeom>
+        </p:spPr>
+        <p:txBody>
+          <a:bodyPr anchorCtr="0" anchor="t" bIns="91425" lIns="91425" rIns="91425" tIns="91425">
+            <a:noAutofit/>
+          </a:bodyPr>
+          <a:lstStyle/>
+          <a:p>
+            <a:pPr lvl="0">
+              <a:spcBef>
+                <a:spcPts val="0"/>
+              </a:spcBef>
+              <a:buClr>
+                <a:schemeClr val="dk1"/>
+              </a:buClr>
+              <a:buSzPct val="47826"/>
+              <a:buFont typeface="Arial"/>
+              <a:buNone/>
+            </a:pPr>
+            <a:r>
+              <a:rPr lang="en" sz="2300"/>
+              <a:t>O Cucumber foi originalmente criado por membros da comunidade Ruby para apoiar o desenvolvimento de testes de aceitação automatizado utilizando a técnica BDD. Desde então o Cucumber cresceu e foi traduzido em várias linguagens, inclusive o Java, permitindo assim que vários de desenvolvedores desfrutem de suas vantagens. </a:t>
+            </a:r>
+          </a:p>
+          <a:p>
+            <a:pPr lvl="0">
+              <a:spcBef>
+                <a:spcPts val="0"/>
+              </a:spcBef>
+              <a:buClr>
+                <a:schemeClr val="dk1"/>
+              </a:buClr>
+              <a:buSzPct val="47826"/>
+              <a:buFont typeface="Arial"/>
+              <a:buNone/>
+            </a:pPr>
+            <a:r>
+              <a:t/>
+            </a:r>
+            <a:endParaRPr sz="2300"/>
+          </a:p>
+          <a:p>
+            <a:pPr lvl="0">
+              <a:spcBef>
+                <a:spcPts val="0"/>
+              </a:spcBef>
+              <a:buNone/>
+            </a:pPr>
+            <a:r>
+              <a:t/>
+            </a:r>
+            <a:endParaRPr sz="2300"/>
+          </a:p>
+        </p:txBody>
+      </p:sp>
+    </p:spTree>
+  </p:cSld>
+  <p:clrMapOvr>
+    <a:masterClrMapping/>
+  </p:clrMapOvr>
+</p:sld>
+</file>
+
+<file path=ppt/slides/slide13.xml><?xml version="1.0" encoding="utf-8"?>
+<p:sld xmlns:a="http://schemas.openxmlformats.org/drawingml/2006/main" xmlns:r="http://schemas.openxmlformats.org/officeDocument/2006/relationships" xmlns:mc="http://schemas.openxmlformats.org/markup-compatibility/2006" xmlns:mv="urn:schemas-microsoft-com:mac:vml" xmlns:p="http://schemas.openxmlformats.org/presentationml/2006/main" xmlns:c="http://schemas.openxmlformats.org/drawingml/2006/chart" xmlns:dgm="http://schemas.openxmlformats.org/drawingml/2006/diagram" xmlns:o="urn:schemas-microsoft-com:office:office" xmlns:v="urn:schemas-microsoft-com:vml" xmlns:pvml="urn:schemas-microsoft-com:office:powerpoint" xmlns:com="http://schemas.openxmlformats.org/drawingml/2006/compatibility" xmlns:p14="http://schemas.microsoft.com/office/powerpoint/2010/main">
+  <p:cSld>
+    <p:spTree>
+      <p:nvGrpSpPr>
+        <p:cNvPr id="454" name="Shape 454"/>
+        <p:cNvGrpSpPr/>
+        <p:nvPr/>
+      </p:nvGrpSpPr>
+      <p:grpSpPr>
+        <a:xfrm>
+          <a:off x="0" y="0"/>
+          <a:ext cx="0" cy="0"/>
+          <a:chOff x="0" y="0"/>
+          <a:chExt cx="0" cy="0"/>
+        </a:xfrm>
+      </p:grpSpPr>
+      <p:sp>
+        <p:nvSpPr>
+          <p:cNvPr id="455" name="Shape 455"/>
           <p:cNvSpPr txBox="1"/>
           <p:nvPr>
             <p:ph type="title"/>
@@ -44291,7 +45001,7 @@
       </p:sp>
       <p:pic>
         <p:nvPicPr>
-          <p:cNvPr descr="image002.gif" id="446" name="Shape 446"/>
+          <p:cNvPr descr="image002.gif" id="456" name="Shape 456"/>
           <p:cNvPicPr preferRelativeResize="0"/>
           <p:nvPr/>
         </p:nvPicPr>
@@ -44325,12 +45035,12 @@
 </p:sld>
 </file>
 
-<file path=ppt/slides/slide12.xml><?xml version="1.0" encoding="utf-8"?>
+<file path=ppt/slides/slide14.xml><?xml version="1.0" encoding="utf-8"?>
 <p:sld xmlns:a="http://schemas.openxmlformats.org/drawingml/2006/main" xmlns:r="http://schemas.openxmlformats.org/officeDocument/2006/relationships" xmlns:mc="http://schemas.openxmlformats.org/markup-compatibility/2006" xmlns:mv="urn:schemas-microsoft-com:mac:vml" xmlns:p="http://schemas.openxmlformats.org/presentationml/2006/main" xmlns:c="http://schemas.openxmlformats.org/drawingml/2006/chart" xmlns:dgm="http://schemas.openxmlformats.org/drawingml/2006/diagram" xmlns:o="urn:schemas-microsoft-com:office:office" xmlns:v="urn:schemas-microsoft-com:vml" xmlns:pvml="urn:schemas-microsoft-com:office:powerpoint" xmlns:com="http://schemas.openxmlformats.org/drawingml/2006/compatibility" xmlns:p14="http://schemas.microsoft.com/office/powerpoint/2010/main">
   <p:cSld>
     <p:spTree>
       <p:nvGrpSpPr>
-        <p:cNvPr id="450" name="Shape 450"/>
+        <p:cNvPr id="460" name="Shape 460"/>
         <p:cNvGrpSpPr/>
         <p:nvPr/>
       </p:nvGrpSpPr>
@@ -44344,7 +45054,7 @@
       </p:grpSpPr>
       <p:sp>
         <p:nvSpPr>
-          <p:cNvPr id="451" name="Shape 451"/>
+          <p:cNvPr id="461" name="Shape 461"/>
           <p:cNvSpPr txBox="1"/>
           <p:nvPr>
             <p:ph type="title"/>
@@ -44401,7 +45111,7 @@
       </p:sp>
       <p:sp>
         <p:nvSpPr>
-          <p:cNvPr id="452" name="Shape 452"/>
+          <p:cNvPr id="462" name="Shape 462"/>
           <p:cNvSpPr txBox="1"/>
           <p:nvPr>
             <p:ph idx="1" type="body"/>
@@ -44491,12 +45201,12 @@
 </p:sld>
 </file>
 
-<file path=ppt/slides/slide13.xml><?xml version="1.0" encoding="utf-8"?>
+<file path=ppt/slides/slide15.xml><?xml version="1.0" encoding="utf-8"?>
 <p:sld xmlns:a="http://schemas.openxmlformats.org/drawingml/2006/main" xmlns:r="http://schemas.openxmlformats.org/officeDocument/2006/relationships" xmlns:mc="http://schemas.openxmlformats.org/markup-compatibility/2006" xmlns:mv="urn:schemas-microsoft-com:mac:vml" xmlns:p="http://schemas.openxmlformats.org/presentationml/2006/main" xmlns:c="http://schemas.openxmlformats.org/drawingml/2006/chart" xmlns:dgm="http://schemas.openxmlformats.org/drawingml/2006/diagram" xmlns:o="urn:schemas-microsoft-com:office:office" xmlns:v="urn:schemas-microsoft-com:vml" xmlns:pvml="urn:schemas-microsoft-com:office:powerpoint" xmlns:com="http://schemas.openxmlformats.org/drawingml/2006/compatibility" xmlns:p14="http://schemas.microsoft.com/office/powerpoint/2010/main">
   <p:cSld>
     <p:spTree>
       <p:nvGrpSpPr>
-        <p:cNvPr id="456" name="Shape 456"/>
+        <p:cNvPr id="466" name="Shape 466"/>
         <p:cNvGrpSpPr/>
         <p:nvPr/>
       </p:nvGrpSpPr>
@@ -44510,7 +45220,102 @@
       </p:grpSpPr>
       <p:sp>
         <p:nvSpPr>
-          <p:cNvPr id="457" name="Shape 457"/>
+          <p:cNvPr id="467" name="Shape 467"/>
+          <p:cNvSpPr txBox="1"/>
+          <p:nvPr>
+            <p:ph idx="1" type="body"/>
+          </p:nvPr>
+        </p:nvSpPr>
+        <p:spPr>
+          <a:xfrm>
+            <a:off x="1242275" y="1704600"/>
+            <a:ext cx="6659700" cy="819900"/>
+          </a:xfrm>
+          <a:prstGeom prst="rect">
+            <a:avLst/>
+          </a:prstGeom>
+        </p:spPr>
+        <p:txBody>
+          <a:bodyPr anchorCtr="0" anchor="t" bIns="91425" lIns="91425" rIns="91425" tIns="91425">
+            <a:noAutofit/>
+          </a:bodyPr>
+          <a:lstStyle/>
+          <a:p>
+            <a:pPr lvl="0">
+              <a:spcBef>
+                <a:spcPts val="0"/>
+              </a:spcBef>
+              <a:buClr>
+                <a:schemeClr val="dk1"/>
+              </a:buClr>
+              <a:buSzPct val="47826"/>
+              <a:buFont typeface="Arial"/>
+              <a:buNone/>
+            </a:pPr>
+            <a:r>
+              <a:rPr lang="en" sz="2300"/>
+              <a:t>Para começarmos, a técnica BDD se inicia na identificação do objetivo de negócio e como exemplo tomamos como objetivo de negócio a “Negociação bancária” que contém um Banco e Conta bancária. Vejamos as funcionalidades que devemos assegurar que funcionem.</a:t>
+            </a:r>
+          </a:p>
+          <a:p>
+            <a:pPr lvl="0">
+              <a:spcBef>
+                <a:spcPts val="0"/>
+              </a:spcBef>
+              <a:buClr>
+                <a:schemeClr val="dk1"/>
+              </a:buClr>
+              <a:buSzPct val="47826"/>
+              <a:buFont typeface="Arial"/>
+              <a:buNone/>
+            </a:pPr>
+            <a:r>
+              <a:t/>
+            </a:r>
+            <a:endParaRPr sz="2300"/>
+          </a:p>
+          <a:p>
+            <a:pPr lvl="0">
+              <a:spcBef>
+                <a:spcPts val="0"/>
+              </a:spcBef>
+              <a:buNone/>
+            </a:pPr>
+            <a:r>
+              <a:t/>
+            </a:r>
+            <a:endParaRPr sz="2300"/>
+          </a:p>
+        </p:txBody>
+      </p:sp>
+    </p:spTree>
+  </p:cSld>
+  <p:clrMapOvr>
+    <a:masterClrMapping/>
+  </p:clrMapOvr>
+</p:sld>
+</file>
+
+<file path=ppt/slides/slide16.xml><?xml version="1.0" encoding="utf-8"?>
+<p:sld xmlns:a="http://schemas.openxmlformats.org/drawingml/2006/main" xmlns:r="http://schemas.openxmlformats.org/officeDocument/2006/relationships" xmlns:mc="http://schemas.openxmlformats.org/markup-compatibility/2006" xmlns:mv="urn:schemas-microsoft-com:mac:vml" xmlns:p="http://schemas.openxmlformats.org/presentationml/2006/main" xmlns:c="http://schemas.openxmlformats.org/drawingml/2006/chart" xmlns:dgm="http://schemas.openxmlformats.org/drawingml/2006/diagram" xmlns:o="urn:schemas-microsoft-com:office:office" xmlns:v="urn:schemas-microsoft-com:vml" xmlns:pvml="urn:schemas-microsoft-com:office:powerpoint" xmlns:com="http://schemas.openxmlformats.org/drawingml/2006/compatibility" xmlns:p14="http://schemas.microsoft.com/office/powerpoint/2010/main">
+  <p:cSld>
+    <p:spTree>
+      <p:nvGrpSpPr>
+        <p:cNvPr id="471" name="Shape 471"/>
+        <p:cNvGrpSpPr/>
+        <p:nvPr/>
+      </p:nvGrpSpPr>
+      <p:grpSpPr>
+        <a:xfrm>
+          <a:off x="0" y="0"/>
+          <a:ext cx="0" cy="0"/>
+          <a:chOff x="0" y="0"/>
+          <a:chExt cx="0" cy="0"/>
+        </a:xfrm>
+      </p:grpSpPr>
+      <p:sp>
+        <p:nvSpPr>
+          <p:cNvPr id="472" name="Shape 472"/>
           <p:cNvSpPr txBox="1"/>
           <p:nvPr>
             <p:ph type="title"/>
@@ -44546,7 +45351,7 @@
       </p:sp>
       <p:sp>
         <p:nvSpPr>
-          <p:cNvPr id="458" name="Shape 458"/>
+          <p:cNvPr id="473" name="Shape 473"/>
           <p:cNvSpPr txBox="1"/>
           <p:nvPr>
             <p:ph idx="1" type="body"/>
@@ -44634,12 +45439,12 @@
 </p:sld>
 </file>
 
-<file path=ppt/slides/slide14.xml><?xml version="1.0" encoding="utf-8"?>
+<file path=ppt/slides/slide17.xml><?xml version="1.0" encoding="utf-8"?>
 <p:sld xmlns:a="http://schemas.openxmlformats.org/drawingml/2006/main" xmlns:r="http://schemas.openxmlformats.org/officeDocument/2006/relationships" xmlns:mc="http://schemas.openxmlformats.org/markup-compatibility/2006" xmlns:mv="urn:schemas-microsoft-com:mac:vml" xmlns:p="http://schemas.openxmlformats.org/presentationml/2006/main" xmlns:c="http://schemas.openxmlformats.org/drawingml/2006/chart" xmlns:dgm="http://schemas.openxmlformats.org/drawingml/2006/diagram" xmlns:o="urn:schemas-microsoft-com:office:office" xmlns:v="urn:schemas-microsoft-com:vml" xmlns:pvml="urn:schemas-microsoft-com:office:powerpoint" xmlns:com="http://schemas.openxmlformats.org/drawingml/2006/compatibility" xmlns:p14="http://schemas.microsoft.com/office/powerpoint/2010/main">
   <p:cSld>
     <p:spTree>
       <p:nvGrpSpPr>
-        <p:cNvPr id="462" name="Shape 462"/>
+        <p:cNvPr id="477" name="Shape 477"/>
         <p:cNvGrpSpPr/>
         <p:nvPr/>
       </p:nvGrpSpPr>
@@ -44653,7 +45458,7 @@
       </p:grpSpPr>
       <p:sp>
         <p:nvSpPr>
-          <p:cNvPr id="463" name="Shape 463"/>
+          <p:cNvPr id="478" name="Shape 478"/>
           <p:cNvSpPr txBox="1"/>
           <p:nvPr>
             <p:ph type="title"/>
@@ -44689,7 +45494,7 @@
       </p:sp>
       <p:sp>
         <p:nvSpPr>
-          <p:cNvPr id="464" name="Shape 464"/>
+          <p:cNvPr id="479" name="Shape 479"/>
           <p:cNvSpPr txBox="1"/>
           <p:nvPr>
             <p:ph idx="1" type="body"/>
@@ -44764,12 +45569,12 @@
 </p:sld>
 </file>
 
-<file path=ppt/slides/slide15.xml><?xml version="1.0" encoding="utf-8"?>
+<file path=ppt/slides/slide18.xml><?xml version="1.0" encoding="utf-8"?>
 <p:sld xmlns:a="http://schemas.openxmlformats.org/drawingml/2006/main" xmlns:r="http://schemas.openxmlformats.org/officeDocument/2006/relationships" xmlns:mc="http://schemas.openxmlformats.org/markup-compatibility/2006" xmlns:mv="urn:schemas-microsoft-com:mac:vml" xmlns:p="http://schemas.openxmlformats.org/presentationml/2006/main" xmlns:c="http://schemas.openxmlformats.org/drawingml/2006/chart" xmlns:dgm="http://schemas.openxmlformats.org/drawingml/2006/diagram" xmlns:o="urn:schemas-microsoft-com:office:office" xmlns:v="urn:schemas-microsoft-com:vml" xmlns:pvml="urn:schemas-microsoft-com:office:powerpoint" xmlns:com="http://schemas.openxmlformats.org/drawingml/2006/compatibility" xmlns:p14="http://schemas.microsoft.com/office/powerpoint/2010/main">
   <p:cSld>
     <p:spTree>
       <p:nvGrpSpPr>
-        <p:cNvPr id="468" name="Shape 468"/>
+        <p:cNvPr id="483" name="Shape 483"/>
         <p:cNvGrpSpPr/>
         <p:nvPr/>
       </p:nvGrpSpPr>
@@ -44783,7 +45588,7 @@
       </p:grpSpPr>
       <p:sp>
         <p:nvSpPr>
-          <p:cNvPr id="469" name="Shape 469"/>
+          <p:cNvPr id="484" name="Shape 484"/>
           <p:cNvSpPr txBox="1"/>
           <p:nvPr>
             <p:ph idx="4294967295" type="ctrTitle"/>
@@ -44825,12 +45630,12 @@
 </p:sld>
 </file>
 
-<file path=ppt/slides/slide16.xml><?xml version="1.0" encoding="utf-8"?>
+<file path=ppt/slides/slide19.xml><?xml version="1.0" encoding="utf-8"?>
 <p:sld xmlns:a="http://schemas.openxmlformats.org/drawingml/2006/main" xmlns:r="http://schemas.openxmlformats.org/officeDocument/2006/relationships" xmlns:mc="http://schemas.openxmlformats.org/markup-compatibility/2006" xmlns:mv="urn:schemas-microsoft-com:mac:vml" xmlns:p="http://schemas.openxmlformats.org/presentationml/2006/main" xmlns:c="http://schemas.openxmlformats.org/drawingml/2006/chart" xmlns:dgm="http://schemas.openxmlformats.org/drawingml/2006/diagram" xmlns:o="urn:schemas-microsoft-com:office:office" xmlns:v="urn:schemas-microsoft-com:vml" xmlns:pvml="urn:schemas-microsoft-com:office:powerpoint" xmlns:com="http://schemas.openxmlformats.org/drawingml/2006/compatibility" xmlns:p14="http://schemas.microsoft.com/office/powerpoint/2010/main">
   <p:cSld>
     <p:spTree>
       <p:nvGrpSpPr>
-        <p:cNvPr id="473" name="Shape 473"/>
+        <p:cNvPr id="488" name="Shape 488"/>
         <p:cNvGrpSpPr/>
         <p:nvPr/>
       </p:nvGrpSpPr>
@@ -44844,43 +45649,7 @@
       </p:grpSpPr>
       <p:sp>
         <p:nvSpPr>
-          <p:cNvPr id="474" name="Shape 474"/>
-          <p:cNvSpPr txBox="1"/>
-          <p:nvPr>
-            <p:ph type="title"/>
-          </p:nvPr>
-        </p:nvSpPr>
-        <p:spPr>
-          <a:xfrm>
-            <a:off x="144075" y="559475"/>
-            <a:ext cx="2142000" cy="2630400"/>
-          </a:xfrm>
-          <a:prstGeom prst="rect">
-            <a:avLst/>
-          </a:prstGeom>
-        </p:spPr>
-        <p:txBody>
-          <a:bodyPr anchorCtr="0" anchor="ctr" bIns="91425" lIns="91425" rIns="91425" tIns="91425">
-            <a:noAutofit/>
-          </a:bodyPr>
-          <a:lstStyle/>
-          <a:p>
-            <a:pPr lvl="0">
-              <a:spcBef>
-                <a:spcPts val="0"/>
-              </a:spcBef>
-              <a:buNone/>
-            </a:pPr>
-            <a:r>
-              <a:t/>
-            </a:r>
-            <a:endParaRPr/>
-          </a:p>
-        </p:txBody>
-      </p:sp>
-      <p:sp>
-        <p:nvSpPr>
-          <p:cNvPr id="475" name="Shape 475"/>
+          <p:cNvPr id="489" name="Shape 489"/>
           <p:cNvSpPr txBox="1"/>
           <p:nvPr>
             <p:ph idx="1" type="body"/>
@@ -44888,8 +45657,8 @@
         </p:nvSpPr>
         <p:spPr>
           <a:xfrm>
-            <a:off x="2901875" y="1033400"/>
-            <a:ext cx="5292300" cy="3267300"/>
+            <a:off x="1242275" y="1704600"/>
+            <a:ext cx="6659700" cy="819900"/>
           </a:xfrm>
           <a:prstGeom prst="rect">
             <a:avLst/>
@@ -44909,7 +45678,7 @@
             </a:pPr>
             <a:r>
               <a:rPr lang="en"/>
-              <a:t>Referencias:</a:t>
+              <a:t>Vamos agora para a prática. </a:t>
             </a:r>
           </a:p>
           <a:p>
@@ -44921,126 +45690,8 @@
             </a:pPr>
             <a:r>
               <a:rPr lang="en"/>
-              <a:t>http://www.devmedia.com.br/desenvolvimento-orientado-a-comportamento-bdd-com-cucumber/33547</a:t>
+              <a:t>PS: abrir agora o arquivo de configuração.</a:t>
             </a:r>
-          </a:p>
-        </p:txBody>
-      </p:sp>
-    </p:spTree>
-  </p:cSld>
-  <p:clrMapOvr>
-    <a:masterClrMapping/>
-  </p:clrMapOvr>
-</p:sld>
-</file>
-
-<file path=ppt/slides/slide17.xml><?xml version="1.0" encoding="utf-8"?>
-<p:sld xmlns:a="http://schemas.openxmlformats.org/drawingml/2006/main" xmlns:r="http://schemas.openxmlformats.org/officeDocument/2006/relationships" xmlns:mc="http://schemas.openxmlformats.org/markup-compatibility/2006" xmlns:mv="urn:schemas-microsoft-com:mac:vml" xmlns:p="http://schemas.openxmlformats.org/presentationml/2006/main" xmlns:c="http://schemas.openxmlformats.org/drawingml/2006/chart" xmlns:dgm="http://schemas.openxmlformats.org/drawingml/2006/diagram" xmlns:o="urn:schemas-microsoft-com:office:office" xmlns:v="urn:schemas-microsoft-com:vml" xmlns:pvml="urn:schemas-microsoft-com:office:powerpoint" xmlns:com="http://schemas.openxmlformats.org/drawingml/2006/compatibility" xmlns:p14="http://schemas.microsoft.com/office/powerpoint/2010/main">
-  <p:cSld>
-    <p:spTree>
-      <p:nvGrpSpPr>
-        <p:cNvPr id="479" name="Shape 479"/>
-        <p:cNvGrpSpPr/>
-        <p:nvPr/>
-      </p:nvGrpSpPr>
-      <p:grpSpPr>
-        <a:xfrm>
-          <a:off x="0" y="0"/>
-          <a:ext cx="0" cy="0"/>
-          <a:chOff x="0" y="0"/>
-          <a:chExt cx="0" cy="0"/>
-        </a:xfrm>
-      </p:grpSpPr>
-      <p:sp>
-        <p:nvSpPr>
-          <p:cNvPr id="480" name="Shape 480"/>
-          <p:cNvSpPr txBox="1"/>
-          <p:nvPr>
-            <p:ph idx="4294967295" type="ctrTitle"/>
-          </p:nvPr>
-        </p:nvSpPr>
-        <p:spPr>
-          <a:xfrm>
-            <a:off x="685800" y="1507150"/>
-            <a:ext cx="6593700" cy="1159800"/>
-          </a:xfrm>
-          <a:prstGeom prst="rect">
-            <a:avLst/>
-          </a:prstGeom>
-        </p:spPr>
-        <p:txBody>
-          <a:bodyPr anchorCtr="0" anchor="ctr" bIns="91425" lIns="91425" rIns="91425" tIns="91425">
-            <a:noAutofit/>
-          </a:bodyPr>
-          <a:lstStyle/>
-          <a:p>
-            <a:pPr lvl="0" rtl="0">
-              <a:spcBef>
-                <a:spcPts val="0"/>
-              </a:spcBef>
-              <a:buNone/>
-            </a:pPr>
-            <a:r>
-              <a:rPr lang="en" sz="6000"/>
-              <a:t>Obrigado!</a:t>
-            </a:r>
-          </a:p>
-        </p:txBody>
-      </p:sp>
-      <p:sp>
-        <p:nvSpPr>
-          <p:cNvPr id="481" name="Shape 481"/>
-          <p:cNvSpPr txBox="1"/>
-          <p:nvPr>
-            <p:ph idx="4294967295" type="subTitle"/>
-          </p:nvPr>
-        </p:nvSpPr>
-        <p:spPr>
-          <a:xfrm>
-            <a:off x="685800" y="2401969"/>
-            <a:ext cx="6593700" cy="1769700"/>
-          </a:xfrm>
-          <a:prstGeom prst="rect">
-            <a:avLst/>
-          </a:prstGeom>
-        </p:spPr>
-        <p:txBody>
-          <a:bodyPr anchorCtr="0" anchor="t" bIns="91425" lIns="91425" rIns="91425" tIns="91425">
-            <a:noAutofit/>
-          </a:bodyPr>
-          <a:lstStyle/>
-          <a:p>
-            <a:pPr lvl="0" rtl="0">
-              <a:spcBef>
-                <a:spcPts val="0"/>
-              </a:spcBef>
-              <a:buNone/>
-            </a:pPr>
-            <a:r>
-              <a:rPr lang="en" sz="3600"/>
-              <a:t>Duvidas?</a:t>
-            </a:r>
-          </a:p>
-          <a:p>
-            <a:pPr lvl="0" rtl="0">
-              <a:spcBef>
-                <a:spcPts val="0"/>
-              </a:spcBef>
-              <a:buClr>
-                <a:schemeClr val="dk1"/>
-              </a:buClr>
-              <a:buSzPct val="55000"/>
-              <a:buFont typeface="Arial"/>
-              <a:buNone/>
-            </a:pPr>
-            <a:r>
-              <a:t/>
-            </a:r>
-            <a:endParaRPr>
-              <a:solidFill>
-                <a:srgbClr val="4A5C65"/>
-              </a:solidFill>
-            </a:endParaRPr>
           </a:p>
         </p:txBody>
       </p:sp>
@@ -45310,6 +45961,233 @@
 </p:sld>
 </file>
 
+<file path=ppt/slides/slide20.xml><?xml version="1.0" encoding="utf-8"?>
+<p:sld xmlns:a="http://schemas.openxmlformats.org/drawingml/2006/main" xmlns:r="http://schemas.openxmlformats.org/officeDocument/2006/relationships" xmlns:mc="http://schemas.openxmlformats.org/markup-compatibility/2006" xmlns:mv="urn:schemas-microsoft-com:mac:vml" xmlns:p="http://schemas.openxmlformats.org/presentationml/2006/main" xmlns:c="http://schemas.openxmlformats.org/drawingml/2006/chart" xmlns:dgm="http://schemas.openxmlformats.org/drawingml/2006/diagram" xmlns:o="urn:schemas-microsoft-com:office:office" xmlns:v="urn:schemas-microsoft-com:vml" xmlns:pvml="urn:schemas-microsoft-com:office:powerpoint" xmlns:com="http://schemas.openxmlformats.org/drawingml/2006/compatibility" xmlns:p14="http://schemas.microsoft.com/office/powerpoint/2010/main">
+  <p:cSld>
+    <p:spTree>
+      <p:nvGrpSpPr>
+        <p:cNvPr id="493" name="Shape 493"/>
+        <p:cNvGrpSpPr/>
+        <p:nvPr/>
+      </p:nvGrpSpPr>
+      <p:grpSpPr>
+        <a:xfrm>
+          <a:off x="0" y="0"/>
+          <a:ext cx="0" cy="0"/>
+          <a:chOff x="0" y="0"/>
+          <a:chExt cx="0" cy="0"/>
+        </a:xfrm>
+      </p:grpSpPr>
+      <p:sp>
+        <p:nvSpPr>
+          <p:cNvPr id="494" name="Shape 494"/>
+          <p:cNvSpPr txBox="1"/>
+          <p:nvPr>
+            <p:ph type="title"/>
+          </p:nvPr>
+        </p:nvSpPr>
+        <p:spPr>
+          <a:xfrm>
+            <a:off x="144075" y="559475"/>
+            <a:ext cx="2142000" cy="2630400"/>
+          </a:xfrm>
+          <a:prstGeom prst="rect">
+            <a:avLst/>
+          </a:prstGeom>
+        </p:spPr>
+        <p:txBody>
+          <a:bodyPr anchorCtr="0" anchor="ctr" bIns="91425" lIns="91425" rIns="91425" tIns="91425">
+            <a:noAutofit/>
+          </a:bodyPr>
+          <a:lstStyle/>
+          <a:p>
+            <a:pPr lvl="0">
+              <a:spcBef>
+                <a:spcPts val="0"/>
+              </a:spcBef>
+              <a:buNone/>
+            </a:pPr>
+            <a:r>
+              <a:t/>
+            </a:r>
+            <a:endParaRPr/>
+          </a:p>
+        </p:txBody>
+      </p:sp>
+      <p:sp>
+        <p:nvSpPr>
+          <p:cNvPr id="495" name="Shape 495"/>
+          <p:cNvSpPr txBox="1"/>
+          <p:nvPr>
+            <p:ph idx="1" type="body"/>
+          </p:nvPr>
+        </p:nvSpPr>
+        <p:spPr>
+          <a:xfrm>
+            <a:off x="2901875" y="1033400"/>
+            <a:ext cx="5292300" cy="3267300"/>
+          </a:xfrm>
+          <a:prstGeom prst="rect">
+            <a:avLst/>
+          </a:prstGeom>
+        </p:spPr>
+        <p:txBody>
+          <a:bodyPr anchorCtr="0" anchor="t" bIns="91425" lIns="91425" rIns="91425" tIns="91425">
+            <a:noAutofit/>
+          </a:bodyPr>
+          <a:lstStyle/>
+          <a:p>
+            <a:pPr lvl="0">
+              <a:spcBef>
+                <a:spcPts val="0"/>
+              </a:spcBef>
+              <a:buNone/>
+            </a:pPr>
+            <a:r>
+              <a:rPr lang="en"/>
+              <a:t>Referencias:</a:t>
+            </a:r>
+          </a:p>
+          <a:p>
+            <a:pPr lvl="0">
+              <a:spcBef>
+                <a:spcPts val="0"/>
+              </a:spcBef>
+              <a:buNone/>
+            </a:pPr>
+            <a:r>
+              <a:rPr lang="en"/>
+              <a:t>http://www.devmedia.com.br/desenvolvimento-orientado-a-comportamento-bdd-com-cucumber/33547</a:t>
+            </a:r>
+          </a:p>
+        </p:txBody>
+      </p:sp>
+    </p:spTree>
+  </p:cSld>
+  <p:clrMapOvr>
+    <a:masterClrMapping/>
+  </p:clrMapOvr>
+</p:sld>
+</file>
+
+<file path=ppt/slides/slide21.xml><?xml version="1.0" encoding="utf-8"?>
+<p:sld xmlns:a="http://schemas.openxmlformats.org/drawingml/2006/main" xmlns:r="http://schemas.openxmlformats.org/officeDocument/2006/relationships" xmlns:mc="http://schemas.openxmlformats.org/markup-compatibility/2006" xmlns:mv="urn:schemas-microsoft-com:mac:vml" xmlns:p="http://schemas.openxmlformats.org/presentationml/2006/main" xmlns:c="http://schemas.openxmlformats.org/drawingml/2006/chart" xmlns:dgm="http://schemas.openxmlformats.org/drawingml/2006/diagram" xmlns:o="urn:schemas-microsoft-com:office:office" xmlns:v="urn:schemas-microsoft-com:vml" xmlns:pvml="urn:schemas-microsoft-com:office:powerpoint" xmlns:com="http://schemas.openxmlformats.org/drawingml/2006/compatibility" xmlns:p14="http://schemas.microsoft.com/office/powerpoint/2010/main">
+  <p:cSld>
+    <p:spTree>
+      <p:nvGrpSpPr>
+        <p:cNvPr id="499" name="Shape 499"/>
+        <p:cNvGrpSpPr/>
+        <p:nvPr/>
+      </p:nvGrpSpPr>
+      <p:grpSpPr>
+        <a:xfrm>
+          <a:off x="0" y="0"/>
+          <a:ext cx="0" cy="0"/>
+          <a:chOff x="0" y="0"/>
+          <a:chExt cx="0" cy="0"/>
+        </a:xfrm>
+      </p:grpSpPr>
+      <p:sp>
+        <p:nvSpPr>
+          <p:cNvPr id="500" name="Shape 500"/>
+          <p:cNvSpPr txBox="1"/>
+          <p:nvPr>
+            <p:ph idx="4294967295" type="ctrTitle"/>
+          </p:nvPr>
+        </p:nvSpPr>
+        <p:spPr>
+          <a:xfrm>
+            <a:off x="685800" y="1507150"/>
+            <a:ext cx="6593700" cy="1159800"/>
+          </a:xfrm>
+          <a:prstGeom prst="rect">
+            <a:avLst/>
+          </a:prstGeom>
+        </p:spPr>
+        <p:txBody>
+          <a:bodyPr anchorCtr="0" anchor="ctr" bIns="91425" lIns="91425" rIns="91425" tIns="91425">
+            <a:noAutofit/>
+          </a:bodyPr>
+          <a:lstStyle/>
+          <a:p>
+            <a:pPr lvl="0" rtl="0">
+              <a:spcBef>
+                <a:spcPts val="0"/>
+              </a:spcBef>
+              <a:buNone/>
+            </a:pPr>
+            <a:r>
+              <a:rPr lang="en" sz="6000"/>
+              <a:t>Obrigado!</a:t>
+            </a:r>
+          </a:p>
+        </p:txBody>
+      </p:sp>
+      <p:sp>
+        <p:nvSpPr>
+          <p:cNvPr id="501" name="Shape 501"/>
+          <p:cNvSpPr txBox="1"/>
+          <p:nvPr>
+            <p:ph idx="4294967295" type="subTitle"/>
+          </p:nvPr>
+        </p:nvSpPr>
+        <p:spPr>
+          <a:xfrm>
+            <a:off x="685800" y="2401969"/>
+            <a:ext cx="6593700" cy="1769700"/>
+          </a:xfrm>
+          <a:prstGeom prst="rect">
+            <a:avLst/>
+          </a:prstGeom>
+        </p:spPr>
+        <p:txBody>
+          <a:bodyPr anchorCtr="0" anchor="t" bIns="91425" lIns="91425" rIns="91425" tIns="91425">
+            <a:noAutofit/>
+          </a:bodyPr>
+          <a:lstStyle/>
+          <a:p>
+            <a:pPr lvl="0" rtl="0">
+              <a:spcBef>
+                <a:spcPts val="0"/>
+              </a:spcBef>
+              <a:buNone/>
+            </a:pPr>
+            <a:r>
+              <a:rPr lang="en" sz="3600"/>
+              <a:t>Duvidas?</a:t>
+            </a:r>
+          </a:p>
+          <a:p>
+            <a:pPr lvl="0" rtl="0">
+              <a:spcBef>
+                <a:spcPts val="0"/>
+              </a:spcBef>
+              <a:buClr>
+                <a:schemeClr val="dk1"/>
+              </a:buClr>
+              <a:buSzPct val="55000"/>
+              <a:buFont typeface="Arial"/>
+              <a:buNone/>
+            </a:pPr>
+            <a:r>
+              <a:t/>
+            </a:r>
+            <a:endParaRPr>
+              <a:solidFill>
+                <a:srgbClr val="4A5C65"/>
+              </a:solidFill>
+            </a:endParaRPr>
+          </a:p>
+        </p:txBody>
+      </p:sp>
+    </p:spTree>
+  </p:cSld>
+  <p:clrMapOvr>
+    <a:masterClrMapping/>
+  </p:clrMapOvr>
+</p:sld>
+</file>
+
 <file path=ppt/slides/slide3.xml><?xml version="1.0" encoding="utf-8"?>
 <p:sld xmlns:a="http://schemas.openxmlformats.org/drawingml/2006/main" xmlns:r="http://schemas.openxmlformats.org/officeDocument/2006/relationships" xmlns:mc="http://schemas.openxmlformats.org/markup-compatibility/2006" xmlns:mv="urn:schemas-microsoft-com:mac:vml" xmlns:p="http://schemas.openxmlformats.org/presentationml/2006/main" xmlns:c="http://schemas.openxmlformats.org/drawingml/2006/chart" xmlns:dgm="http://schemas.openxmlformats.org/drawingml/2006/diagram" xmlns:o="urn:schemas-microsoft-com:office:office" xmlns:v="urn:schemas-microsoft-com:vml" xmlns:pvml="urn:schemas-microsoft-com:office:powerpoint" xmlns:com="http://schemas.openxmlformats.org/drawingml/2006/compatibility" xmlns:p14="http://schemas.microsoft.com/office/powerpoint/2010/main">
   <p:cSld>
@@ -45470,8 +46348,8 @@
               <a:buNone/>
             </a:pPr>
             <a:r>
-              <a:rPr lang="en"/>
-              <a:t>BDD é um conjunto de práticas de engenharia de software projetado para ajudar as equipes a construir e entregar mais rápido o software.</a:t>
+              <a:rPr lang="en" sz="2400"/>
+              <a:t>BDD é técnica de desenvolvimento ágil que visa integrar regras de negócios com linguagem de programação, focando o comportamento do software. Além disso, pode-se dizer também, que BDD é a evolução do TDD. Isto porque, os testes ainda orientam o desenvolvimento, ou seja, primeiro se escreve o teste e depois o código.</a:t>
             </a:r>
           </a:p>
         </p:txBody>
@@ -45504,6 +46382,67 @@
       <p:sp>
         <p:nvSpPr>
           <p:cNvPr id="400" name="Shape 400"/>
+          <p:cNvSpPr txBox="1"/>
+          <p:nvPr>
+            <p:ph idx="1" type="body"/>
+          </p:nvPr>
+        </p:nvSpPr>
+        <p:spPr>
+          <a:xfrm>
+            <a:off x="1242275" y="1704600"/>
+            <a:ext cx="6659700" cy="819900"/>
+          </a:xfrm>
+          <a:prstGeom prst="rect">
+            <a:avLst/>
+          </a:prstGeom>
+        </p:spPr>
+        <p:txBody>
+          <a:bodyPr anchorCtr="0" anchor="t" bIns="91425" lIns="91425" rIns="91425" tIns="91425">
+            <a:noAutofit/>
+          </a:bodyPr>
+          <a:lstStyle/>
+          <a:p>
+            <a:pPr lvl="0">
+              <a:spcBef>
+                <a:spcPts val="0"/>
+              </a:spcBef>
+              <a:buNone/>
+            </a:pPr>
+            <a:r>
+              <a:rPr lang="en" sz="2100"/>
+              <a:t>O foco em BDD é a linguagem e as interações usadas no processo de desenvolvimento de software. Desenvolvedores que se beneficiam destas técnicas escrevem os testes em sua língua nativa em combinação com a linguagem ubíqua (Ubiquitous Language). Isso permite que eles foquem em por que o código deve ser criado, ao invés de detalhes técnicos, e ainda possibilita uma comunicação eficiente entre as equipes de desenvolvimento e testes.</a:t>
+            </a:r>
+          </a:p>
+        </p:txBody>
+      </p:sp>
+    </p:spTree>
+  </p:cSld>
+  <p:clrMapOvr>
+    <a:masterClrMapping/>
+  </p:clrMapOvr>
+</p:sld>
+</file>
+
+<file path=ppt/slides/slide6.xml><?xml version="1.0" encoding="utf-8"?>
+<p:sld xmlns:a="http://schemas.openxmlformats.org/drawingml/2006/main" xmlns:r="http://schemas.openxmlformats.org/officeDocument/2006/relationships" xmlns:mc="http://schemas.openxmlformats.org/markup-compatibility/2006" xmlns:mv="urn:schemas-microsoft-com:mac:vml" xmlns:p="http://schemas.openxmlformats.org/presentationml/2006/main" xmlns:c="http://schemas.openxmlformats.org/drawingml/2006/chart" xmlns:dgm="http://schemas.openxmlformats.org/drawingml/2006/diagram" xmlns:o="urn:schemas-microsoft-com:office:office" xmlns:v="urn:schemas-microsoft-com:vml" xmlns:pvml="urn:schemas-microsoft-com:office:powerpoint" xmlns:com="http://schemas.openxmlformats.org/drawingml/2006/compatibility" xmlns:p14="http://schemas.microsoft.com/office/powerpoint/2010/main">
+  <p:cSld>
+    <p:spTree>
+      <p:nvGrpSpPr>
+        <p:cNvPr id="404" name="Shape 404"/>
+        <p:cNvGrpSpPr/>
+        <p:nvPr/>
+      </p:nvGrpSpPr>
+      <p:grpSpPr>
+        <a:xfrm>
+          <a:off x="0" y="0"/>
+          <a:ext cx="0" cy="0"/>
+          <a:chOff x="0" y="0"/>
+          <a:chExt cx="0" cy="0"/>
+        </a:xfrm>
+      </p:grpSpPr>
+      <p:sp>
+        <p:nvSpPr>
+          <p:cNvPr id="405" name="Shape 405"/>
           <p:cNvSpPr txBox="1"/>
           <p:nvPr>
             <p:ph type="title"/>
@@ -45539,7 +46478,7 @@
       </p:sp>
       <p:sp>
         <p:nvSpPr>
-          <p:cNvPr id="401" name="Shape 401"/>
+          <p:cNvPr id="406" name="Shape 406"/>
           <p:cNvSpPr txBox="1"/>
           <p:nvPr>
             <p:ph idx="1" type="body"/>
@@ -45589,7 +46528,7 @@
             </a:pPr>
             <a:r>
               <a:rPr lang="en"/>
-              <a:t>BDD NÃO é um método de desenvolvimento de software, muito menos um substituto para o XP, SCRUm e afins.</a:t>
+              <a:t>BDD NÃO é um método de desenvolvimento de software, muito menos um substituto para o XP, SCRUM e afins.</a:t>
             </a:r>
           </a:p>
           <a:p>
@@ -45614,12 +46553,12 @@
 </p:sld>
 </file>
 
-<file path=ppt/slides/slide6.xml><?xml version="1.0" encoding="utf-8"?>
+<file path=ppt/slides/slide7.xml><?xml version="1.0" encoding="utf-8"?>
 <p:sld xmlns:a="http://schemas.openxmlformats.org/drawingml/2006/main" xmlns:r="http://schemas.openxmlformats.org/officeDocument/2006/relationships" xmlns:mc="http://schemas.openxmlformats.org/markup-compatibility/2006" xmlns:mv="urn:schemas-microsoft-com:mac:vml" xmlns:p="http://schemas.openxmlformats.org/presentationml/2006/main" xmlns:c="http://schemas.openxmlformats.org/drawingml/2006/chart" xmlns:dgm="http://schemas.openxmlformats.org/drawingml/2006/diagram" xmlns:o="urn:schemas-microsoft-com:office:office" xmlns:v="urn:schemas-microsoft-com:vml" xmlns:pvml="urn:schemas-microsoft-com:office:powerpoint" xmlns:com="http://schemas.openxmlformats.org/drawingml/2006/compatibility" xmlns:p14="http://schemas.microsoft.com/office/powerpoint/2010/main">
   <p:cSld>
     <p:spTree>
       <p:nvGrpSpPr>
-        <p:cNvPr id="405" name="Shape 405"/>
+        <p:cNvPr id="410" name="Shape 410"/>
         <p:cNvGrpSpPr/>
         <p:nvPr/>
       </p:nvGrpSpPr>
@@ -45633,7 +46572,7 @@
       </p:grpSpPr>
       <p:sp>
         <p:nvSpPr>
-          <p:cNvPr id="406" name="Shape 406"/>
+          <p:cNvPr id="411" name="Shape 411"/>
           <p:cNvSpPr/>
           <p:nvPr/>
         </p:nvSpPr>
@@ -45673,7 +46612,7 @@
       </p:sp>
       <p:sp>
         <p:nvSpPr>
-          <p:cNvPr id="407" name="Shape 407"/>
+          <p:cNvPr id="412" name="Shape 412"/>
           <p:cNvSpPr txBox="1"/>
           <p:nvPr>
             <p:ph idx="4294967295" type="ctrTitle"/>
@@ -45709,7 +46648,7 @@
       </p:sp>
       <p:grpSp>
         <p:nvGrpSpPr>
-          <p:cNvPr id="408" name="Shape 408"/>
+          <p:cNvPr id="413" name="Shape 413"/>
           <p:cNvGrpSpPr/>
           <p:nvPr/>
         </p:nvGrpSpPr>
@@ -45723,7 +46662,7 @@
         </p:grpSpPr>
         <p:sp>
           <p:nvSpPr>
-            <p:cNvPr id="409" name="Shape 409"/>
+            <p:cNvPr id="414" name="Shape 414"/>
             <p:cNvSpPr/>
             <p:nvPr/>
           </p:nvSpPr>
@@ -45875,7 +46814,7 @@
         </p:sp>
         <p:sp>
           <p:nvSpPr>
-            <p:cNvPr id="410" name="Shape 410"/>
+            <p:cNvPr id="415" name="Shape 415"/>
             <p:cNvSpPr/>
             <p:nvPr/>
           </p:nvSpPr>
@@ -46739,7 +47678,7 @@
       </p:grpSp>
       <p:grpSp>
         <p:nvGrpSpPr>
-          <p:cNvPr id="411" name="Shape 411"/>
+          <p:cNvPr id="416" name="Shape 416"/>
           <p:cNvGrpSpPr/>
           <p:nvPr/>
         </p:nvGrpSpPr>
@@ -46753,7 +47692,7 @@
         </p:grpSpPr>
         <p:sp>
           <p:nvSpPr>
-            <p:cNvPr id="412" name="Shape 412"/>
+            <p:cNvPr id="417" name="Shape 417"/>
             <p:cNvSpPr/>
             <p:nvPr/>
           </p:nvSpPr>
@@ -47364,7 +48303,7 @@
         </p:sp>
         <p:sp>
           <p:nvSpPr>
-            <p:cNvPr id="413" name="Shape 413"/>
+            <p:cNvPr id="418" name="Shape 418"/>
             <p:cNvSpPr/>
             <p:nvPr/>
           </p:nvSpPr>
@@ -47508,7 +48447,7 @@
         </p:sp>
         <p:sp>
           <p:nvSpPr>
-            <p:cNvPr id="414" name="Shape 414"/>
+            <p:cNvPr id="419" name="Shape 419"/>
             <p:cNvSpPr/>
             <p:nvPr/>
           </p:nvSpPr>
@@ -47658,7 +48597,7 @@
         </p:sp>
         <p:sp>
           <p:nvSpPr>
-            <p:cNvPr id="415" name="Shape 415"/>
+            <p:cNvPr id="420" name="Shape 420"/>
             <p:cNvSpPr/>
             <p:nvPr/>
           </p:nvSpPr>
@@ -47809,7 +48748,7 @@
       </p:grpSp>
       <p:sp>
         <p:nvSpPr>
-          <p:cNvPr id="416" name="Shape 416"/>
+          <p:cNvPr id="421" name="Shape 421"/>
           <p:cNvSpPr/>
           <p:nvPr/>
         </p:nvSpPr>
@@ -48160,7 +49099,7 @@
       </p:sp>
       <p:sp>
         <p:nvSpPr>
-          <p:cNvPr id="417" name="Shape 417"/>
+          <p:cNvPr id="422" name="Shape 422"/>
           <p:cNvSpPr/>
           <p:nvPr/>
         </p:nvSpPr>
@@ -48511,7 +49450,7 @@
       </p:sp>
       <p:sp>
         <p:nvSpPr>
-          <p:cNvPr id="418" name="Shape 418"/>
+          <p:cNvPr id="423" name="Shape 423"/>
           <p:cNvSpPr/>
           <p:nvPr/>
         </p:nvSpPr>
@@ -48862,7 +49801,7 @@
       </p:sp>
       <p:sp>
         <p:nvSpPr>
-          <p:cNvPr id="419" name="Shape 419"/>
+          <p:cNvPr id="424" name="Shape 424"/>
           <p:cNvSpPr/>
           <p:nvPr/>
         </p:nvSpPr>
@@ -49219,12 +50158,12 @@
 </p:sld>
 </file>
 
-<file path=ppt/slides/slide7.xml><?xml version="1.0" encoding="utf-8"?>
+<file path=ppt/slides/slide8.xml><?xml version="1.0" encoding="utf-8"?>
 <p:sld xmlns:a="http://schemas.openxmlformats.org/drawingml/2006/main" xmlns:r="http://schemas.openxmlformats.org/officeDocument/2006/relationships" xmlns:mc="http://schemas.openxmlformats.org/markup-compatibility/2006" xmlns:mv="urn:schemas-microsoft-com:mac:vml" xmlns:p="http://schemas.openxmlformats.org/presentationml/2006/main" xmlns:c="http://schemas.openxmlformats.org/drawingml/2006/chart" xmlns:dgm="http://schemas.openxmlformats.org/drawingml/2006/diagram" xmlns:o="urn:schemas-microsoft-com:office:office" xmlns:v="urn:schemas-microsoft-com:vml" xmlns:pvml="urn:schemas-microsoft-com:office:powerpoint" xmlns:com="http://schemas.openxmlformats.org/drawingml/2006/compatibility" xmlns:p14="http://schemas.microsoft.com/office/powerpoint/2010/main">
   <p:cSld>
     <p:spTree>
       <p:nvGrpSpPr>
-        <p:cNvPr id="423" name="Shape 423"/>
+        <p:cNvPr id="428" name="Shape 428"/>
         <p:cNvGrpSpPr/>
         <p:nvPr/>
       </p:nvGrpSpPr>
@@ -49238,7 +50177,7 @@
       </p:grpSpPr>
       <p:sp>
         <p:nvSpPr>
-          <p:cNvPr id="424" name="Shape 424"/>
+          <p:cNvPr id="429" name="Shape 429"/>
           <p:cNvSpPr txBox="1"/>
           <p:nvPr>
             <p:ph idx="1" type="body"/>
@@ -49259,16 +50198,38 @@
           </a:bodyPr>
           <a:lstStyle/>
           <a:p>
-            <a:pPr lvl="0" rtl="0">
+            <a:pPr lvl="0">
               <a:spcBef>
                 <a:spcPts val="0"/>
               </a:spcBef>
+              <a:buClr>
+                <a:schemeClr val="dk1"/>
+              </a:buClr>
+              <a:buSzPct val="73333"/>
+              <a:buFont typeface="Arial"/>
               <a:buNone/>
             </a:pPr>
             <a:r>
-              <a:rPr b="1" lang="en"/>
-              <a:t>Vocabulário BDD</a:t>
+              <a:rPr b="1" lang="en" sz="1500"/>
+              <a:t>Para explicar o funcionamento do BDD vamos usar o seguinte exemplo: uma equipe praticante de BDD decide implementar uma nova funcionalidade e para isso, eles trabalham em conjunto com os usuários e outras partes interessadas para definir as histórias e cenários do que os usuários esperam dessa funcionalidade. Em particular, os usuários ajudam a definir um conjunto de exemplos concretos que ilustram resultados que a nova funcionalidade deve fornecer. Esses exemplos são criados utilizando um vocabulário comum e podem ser facilmente compreendidos pelos usuários finais e membros da equipe de desenvolvimento de software, e geralmente são expressos usando Cenário (Scenario), Dado (Given), Quando (When) e Então (Then).</a:t>
             </a:r>
+          </a:p>
+          <a:p>
+            <a:pPr lvl="0">
+              <a:spcBef>
+                <a:spcPts val="0"/>
+              </a:spcBef>
+              <a:buClr>
+                <a:schemeClr val="dk1"/>
+              </a:buClr>
+              <a:buSzPct val="73333"/>
+              <a:buFont typeface="Arial"/>
+              <a:buNone/>
+            </a:pPr>
+            <a:r>
+              <a:t/>
+            </a:r>
+            <a:endParaRPr b="1" sz="1500"/>
           </a:p>
           <a:p>
             <a:pPr lvl="0">
@@ -49278,114 +50239,15 @@
               <a:buNone/>
             </a:pPr>
             <a:r>
-              <a:rPr b="1" lang="en">
-                <a:latin typeface="Lato"/>
-                <a:ea typeface="Lato"/>
-                <a:cs typeface="Lato"/>
-                <a:sym typeface="Lato"/>
-              </a:rPr>
-              <a:t>Cenário (</a:t>
+              <a:t/>
             </a:r>
-            <a:r>
-              <a:rPr lang="en"/>
-              <a:t>Scenario</a:t>
-            </a:r>
-            <a:r>
-              <a:rPr b="1" lang="en">
-                <a:latin typeface="Lato"/>
-                <a:ea typeface="Lato"/>
-                <a:cs typeface="Lato"/>
-                <a:sym typeface="Lato"/>
-              </a:rPr>
-              <a:t>),</a:t>
-            </a:r>
-          </a:p>
-          <a:p>
-            <a:pPr lvl="0">
-              <a:spcBef>
-                <a:spcPts val="0"/>
-              </a:spcBef>
-              <a:buNone/>
-            </a:pPr>
-            <a:r>
-              <a:rPr b="1" lang="en">
-                <a:latin typeface="Lato"/>
-                <a:ea typeface="Lato"/>
-                <a:cs typeface="Lato"/>
-                <a:sym typeface="Lato"/>
-              </a:rPr>
-              <a:t>Dado (</a:t>
-            </a:r>
-            <a:r>
-              <a:rPr lang="en"/>
-              <a:t>Given),</a:t>
-            </a:r>
-          </a:p>
-          <a:p>
-            <a:pPr lvl="0">
-              <a:spcBef>
-                <a:spcPts val="0"/>
-              </a:spcBef>
-              <a:buNone/>
-            </a:pPr>
-            <a:r>
-              <a:rPr b="1" lang="en">
-                <a:latin typeface="Lato"/>
-                <a:ea typeface="Lato"/>
-                <a:cs typeface="Lato"/>
-                <a:sym typeface="Lato"/>
-              </a:rPr>
-              <a:t>Quando(</a:t>
-            </a:r>
-            <a:r>
-              <a:rPr lang="en"/>
-              <a:t>When</a:t>
-            </a:r>
-            <a:r>
-              <a:rPr b="1" lang="en">
-                <a:latin typeface="Lato"/>
-                <a:ea typeface="Lato"/>
-                <a:cs typeface="Lato"/>
-                <a:sym typeface="Lato"/>
-              </a:rPr>
-              <a:t>),</a:t>
-            </a:r>
-          </a:p>
-          <a:p>
-            <a:pPr lvl="0">
-              <a:spcBef>
-                <a:spcPts val="0"/>
-              </a:spcBef>
-              <a:buNone/>
-            </a:pPr>
-            <a:r>
-              <a:rPr b="1" lang="en">
-                <a:latin typeface="Lato"/>
-                <a:ea typeface="Lato"/>
-                <a:cs typeface="Lato"/>
-                <a:sym typeface="Lato"/>
-              </a:rPr>
-              <a:t>Então (</a:t>
-            </a:r>
-            <a:r>
-              <a:rPr lang="en"/>
-              <a:t>Then</a:t>
-            </a:r>
-            <a:r>
-              <a:rPr b="1" lang="en">
-                <a:latin typeface="Lato"/>
-                <a:ea typeface="Lato"/>
-                <a:cs typeface="Lato"/>
-                <a:sym typeface="Lato"/>
-              </a:rPr>
-              <a:t>)</a:t>
-            </a:r>
+            <a:endParaRPr b="1" sz="1500"/>
           </a:p>
         </p:txBody>
       </p:sp>
       <p:sp>
         <p:nvSpPr>
-          <p:cNvPr id="425" name="Shape 425"/>
+          <p:cNvPr id="430" name="Shape 430"/>
           <p:cNvSpPr txBox="1"/>
           <p:nvPr>
             <p:ph type="title"/>
@@ -49427,12 +50289,12 @@
 </p:sld>
 </file>
 
-<file path=ppt/slides/slide8.xml><?xml version="1.0" encoding="utf-8"?>
+<file path=ppt/slides/slide9.xml><?xml version="1.0" encoding="utf-8"?>
 <p:sld xmlns:a="http://schemas.openxmlformats.org/drawingml/2006/main" xmlns:r="http://schemas.openxmlformats.org/officeDocument/2006/relationships" xmlns:mc="http://schemas.openxmlformats.org/markup-compatibility/2006" xmlns:mv="urn:schemas-microsoft-com:mac:vml" xmlns:p="http://schemas.openxmlformats.org/presentationml/2006/main" xmlns:c="http://schemas.openxmlformats.org/drawingml/2006/chart" xmlns:dgm="http://schemas.openxmlformats.org/drawingml/2006/diagram" xmlns:o="urn:schemas-microsoft-com:office:office" xmlns:v="urn:schemas-microsoft-com:vml" xmlns:pvml="urn:schemas-microsoft-com:office:powerpoint" xmlns:com="http://schemas.openxmlformats.org/drawingml/2006/compatibility" xmlns:p14="http://schemas.microsoft.com/office/powerpoint/2010/main">
   <p:cSld>
     <p:spTree>
       <p:nvGrpSpPr>
-        <p:cNvPr id="429" name="Shape 429"/>
+        <p:cNvPr id="434" name="Shape 434"/>
         <p:cNvGrpSpPr/>
         <p:nvPr/>
       </p:nvGrpSpPr>
@@ -49446,7 +50308,7 @@
       </p:grpSpPr>
       <p:pic>
         <p:nvPicPr>
-          <p:cNvPr id="430" name="Shape 430"/>
+          <p:cNvPr id="435" name="Shape 435"/>
           <p:cNvPicPr preferRelativeResize="0"/>
           <p:nvPr/>
         </p:nvPicPr>
@@ -49472,225 +50334,6 @@
           </a:ln>
         </p:spPr>
       </p:pic>
-    </p:spTree>
-  </p:cSld>
-  <p:clrMapOvr>
-    <a:masterClrMapping/>
-  </p:clrMapOvr>
-</p:sld>
-</file>
-
-<file path=ppt/slides/slide9.xml><?xml version="1.0" encoding="utf-8"?>
-<p:sld xmlns:a="http://schemas.openxmlformats.org/drawingml/2006/main" xmlns:r="http://schemas.openxmlformats.org/officeDocument/2006/relationships" xmlns:mc="http://schemas.openxmlformats.org/markup-compatibility/2006" xmlns:mv="urn:schemas-microsoft-com:mac:vml" xmlns:p="http://schemas.openxmlformats.org/presentationml/2006/main" xmlns:c="http://schemas.openxmlformats.org/drawingml/2006/chart" xmlns:dgm="http://schemas.openxmlformats.org/drawingml/2006/diagram" xmlns:o="urn:schemas-microsoft-com:office:office" xmlns:v="urn:schemas-microsoft-com:vml" xmlns:pvml="urn:schemas-microsoft-com:office:powerpoint" xmlns:com="http://schemas.openxmlformats.org/drawingml/2006/compatibility" xmlns:p14="http://schemas.microsoft.com/office/powerpoint/2010/main">
-  <p:cSld>
-    <p:spTree>
-      <p:nvGrpSpPr>
-        <p:cNvPr id="434" name="Shape 434"/>
-        <p:cNvGrpSpPr/>
-        <p:nvPr/>
-      </p:nvGrpSpPr>
-      <p:grpSpPr>
-        <a:xfrm>
-          <a:off x="0" y="0"/>
-          <a:ext cx="0" cy="0"/>
-          <a:chOff x="0" y="0"/>
-          <a:chExt cx="0" cy="0"/>
-        </a:xfrm>
-      </p:grpSpPr>
-      <p:sp>
-        <p:nvSpPr>
-          <p:cNvPr id="435" name="Shape 435"/>
-          <p:cNvSpPr txBox="1"/>
-          <p:nvPr>
-            <p:ph type="title"/>
-          </p:nvPr>
-        </p:nvSpPr>
-        <p:spPr>
-          <a:xfrm>
-            <a:off x="144075" y="559475"/>
-            <a:ext cx="2142000" cy="2630400"/>
-          </a:xfrm>
-          <a:prstGeom prst="rect">
-            <a:avLst/>
-          </a:prstGeom>
-        </p:spPr>
-        <p:txBody>
-          <a:bodyPr anchorCtr="0" anchor="ctr" bIns="91425" lIns="91425" rIns="91425" tIns="91425">
-            <a:noAutofit/>
-          </a:bodyPr>
-          <a:lstStyle/>
-          <a:p>
-            <a:pPr lvl="0" rtl="0">
-              <a:spcBef>
-                <a:spcPts val="0"/>
-              </a:spcBef>
-              <a:buNone/>
-            </a:pPr>
-            <a:r>
-              <a:rPr lang="en"/>
-              <a:t>E a equipe </a:t>
-            </a:r>
-            <a:r>
-              <a:rPr lang="en"/>
-              <a:t>identificou</a:t>
-            </a:r>
-            <a:r>
-              <a:rPr lang="en"/>
-              <a:t> e especificou que:</a:t>
-            </a:r>
-          </a:p>
-        </p:txBody>
-      </p:sp>
-      <p:sp>
-        <p:nvSpPr>
-          <p:cNvPr id="436" name="Shape 436"/>
-          <p:cNvSpPr txBox="1"/>
-          <p:nvPr>
-            <p:ph idx="1" type="body"/>
-          </p:nvPr>
-        </p:nvSpPr>
-        <p:spPr>
-          <a:xfrm>
-            <a:off x="2998175" y="559475"/>
-            <a:ext cx="5491500" cy="3849300"/>
-          </a:xfrm>
-          <a:prstGeom prst="rect">
-            <a:avLst/>
-          </a:prstGeom>
-        </p:spPr>
-        <p:txBody>
-          <a:bodyPr anchorCtr="0" anchor="t" bIns="91425" lIns="91425" rIns="91425" tIns="91425">
-            <a:noAutofit/>
-          </a:bodyPr>
-          <a:lstStyle/>
-          <a:p>
-            <a:pPr lvl="0">
-              <a:spcBef>
-                <a:spcPts val="0"/>
-              </a:spcBef>
-              <a:buNone/>
-            </a:pPr>
-            <a:r>
-              <a:rPr b="1" lang="en" sz="1800">
-                <a:latin typeface="Lato"/>
-                <a:ea typeface="Lato"/>
-                <a:cs typeface="Lato"/>
-                <a:sym typeface="Lato"/>
-              </a:rPr>
-              <a:t>Cenário: </a:t>
-            </a:r>
-            <a:r>
-              <a:rPr lang="en" sz="1800"/>
-              <a:t>Transferir dinheiro para uma conta poupança</a:t>
-            </a:r>
-          </a:p>
-          <a:p>
-            <a:pPr lvl="0">
-              <a:spcBef>
-                <a:spcPts val="0"/>
-              </a:spcBef>
-              <a:buNone/>
-            </a:pPr>
-            <a:r>
-              <a:rPr b="1" lang="en" sz="1800">
-                <a:latin typeface="Lato"/>
-                <a:ea typeface="Lato"/>
-                <a:cs typeface="Lato"/>
-                <a:sym typeface="Lato"/>
-              </a:rPr>
-              <a:t>Dado </a:t>
-            </a:r>
-            <a:r>
-              <a:rPr lang="en" sz="1800"/>
-              <a:t>que eu tenho uma conta corrente com R$ 1000 </a:t>
-            </a:r>
-          </a:p>
-          <a:p>
-            <a:pPr lvl="0">
-              <a:spcBef>
-                <a:spcPts val="0"/>
-              </a:spcBef>
-              <a:buNone/>
-            </a:pPr>
-            <a:r>
-              <a:rPr b="1" lang="en" sz="1800">
-                <a:latin typeface="Lato"/>
-                <a:ea typeface="Lato"/>
-                <a:cs typeface="Lato"/>
-                <a:sym typeface="Lato"/>
-              </a:rPr>
-              <a:t>E </a:t>
-            </a:r>
-            <a:r>
-              <a:rPr lang="en" sz="1800"/>
-              <a:t> que eu tenha uma conta poupança com R$ 2000</a:t>
-            </a:r>
-          </a:p>
-          <a:p>
-            <a:pPr lvl="0">
-              <a:spcBef>
-                <a:spcPts val="0"/>
-              </a:spcBef>
-              <a:buNone/>
-            </a:pPr>
-            <a:r>
-              <a:rPr b="1" lang="en" sz="1800">
-                <a:latin typeface="Lato"/>
-                <a:ea typeface="Lato"/>
-                <a:cs typeface="Lato"/>
-                <a:sym typeface="Lato"/>
-              </a:rPr>
-              <a:t>Quando </a:t>
-            </a:r>
-            <a:r>
-              <a:rPr lang="en" sz="1800"/>
-              <a:t>eu transferir R$ 500 para a minha conta poupança</a:t>
-            </a:r>
-          </a:p>
-          <a:p>
-            <a:pPr lvl="0">
-              <a:spcBef>
-                <a:spcPts val="0"/>
-              </a:spcBef>
-              <a:buNone/>
-            </a:pPr>
-            <a:r>
-              <a:rPr b="1" lang="en" sz="1800">
-                <a:latin typeface="Lato"/>
-                <a:ea typeface="Lato"/>
-                <a:cs typeface="Lato"/>
-                <a:sym typeface="Lato"/>
-              </a:rPr>
-              <a:t>Então </a:t>
-            </a:r>
-            <a:r>
-              <a:rPr lang="en" sz="1800"/>
-              <a:t>eu deveria ter R$ 500 em minha conta corrente</a:t>
-            </a:r>
-          </a:p>
-          <a:p>
-            <a:pPr lvl="0" rtl="0">
-              <a:spcBef>
-                <a:spcPts val="0"/>
-              </a:spcBef>
-              <a:buNone/>
-            </a:pPr>
-            <a:r>
-              <a:rPr b="1" lang="en" sz="1800">
-                <a:latin typeface="Lato"/>
-                <a:ea typeface="Lato"/>
-                <a:cs typeface="Lato"/>
-                <a:sym typeface="Lato"/>
-              </a:rPr>
-              <a:t>E </a:t>
-            </a:r>
-            <a:r>
-              <a:rPr lang="en" sz="1800"/>
-              <a:t>eu deveria ter R$ 2500 em minha conta poupança.</a:t>
-            </a:r>
-          </a:p>
-        </p:txBody>
-      </p:sp>
     </p:spTree>
   </p:cSld>
   <p:clrMapOvr>

</xml_diff>